<commit_message>
changes to the code example
</commit_message>
<xml_diff>
--- a/17ass/17ass.pptx
+++ b/17ass/17ass.pptx
@@ -6,12 +6,28 @@
   </p:sldMasterIdLst>
   <p:sldIdLst>
     <p:sldId id="256" r:id="rId2"/>
-    <p:sldId id="257" r:id="rId3"/>
-    <p:sldId id="258" r:id="rId4"/>
-    <p:sldId id="259" r:id="rId5"/>
-    <p:sldId id="260" r:id="rId6"/>
-    <p:sldId id="261" r:id="rId7"/>
-    <p:sldId id="262" r:id="rId8"/>
+    <p:sldId id="260" r:id="rId3"/>
+    <p:sldId id="263" r:id="rId4"/>
+    <p:sldId id="264" r:id="rId5"/>
+    <p:sldId id="265" r:id="rId6"/>
+    <p:sldId id="266" r:id="rId7"/>
+    <p:sldId id="267" r:id="rId8"/>
+    <p:sldId id="257" r:id="rId9"/>
+    <p:sldId id="258" r:id="rId10"/>
+    <p:sldId id="259" r:id="rId11"/>
+    <p:sldId id="261" r:id="rId12"/>
+    <p:sldId id="262" r:id="rId13"/>
+    <p:sldId id="268" r:id="rId14"/>
+    <p:sldId id="270" r:id="rId15"/>
+    <p:sldId id="271" r:id="rId16"/>
+    <p:sldId id="269" r:id="rId17"/>
+    <p:sldId id="272" r:id="rId18"/>
+    <p:sldId id="273" r:id="rId19"/>
+    <p:sldId id="274" r:id="rId20"/>
+    <p:sldId id="275" r:id="rId21"/>
+    <p:sldId id="276" r:id="rId22"/>
+    <p:sldId id="277" r:id="rId23"/>
+    <p:sldId id="278" r:id="rId24"/>
   </p:sldIdLst>
   <p:sldSz cx="12192000" cy="6858000"/>
   <p:notesSz cx="6858000" cy="9144000"/>
@@ -110,6 +126,11 @@
       </a:defRPr>
     </a:lvl9pPr>
   </p:defaultTextStyle>
+  <p:extLst>
+    <p:ext uri="{EFAFB233-063F-42B5-8137-9DF3F51BA10A}">
+      <p15:sldGuideLst xmlns:p15="http://schemas.microsoft.com/office/powerpoint/2012/main"/>
+    </p:ext>
+  </p:extLst>
 </p:presentation>
 </file>
 
@@ -262,7 +283,7 @@
           <a:p>
             <a:fld id="{56BC5E1A-6555-214D-BE28-650DBB619B37}" type="datetimeFigureOut">
               <a:rPr lang="en-IL" smtClean="0"/>
-              <a:t>24/04/2023</a:t>
+              <a:t>07/05/2023</a:t>
             </a:fld>
             <a:endParaRPr lang="en-IL"/>
           </a:p>
@@ -462,7 +483,7 @@
           <a:p>
             <a:fld id="{56BC5E1A-6555-214D-BE28-650DBB619B37}" type="datetimeFigureOut">
               <a:rPr lang="en-IL" smtClean="0"/>
-              <a:t>24/04/2023</a:t>
+              <a:t>07/05/2023</a:t>
             </a:fld>
             <a:endParaRPr lang="en-IL"/>
           </a:p>
@@ -672,7 +693,7 @@
           <a:p>
             <a:fld id="{56BC5E1A-6555-214D-BE28-650DBB619B37}" type="datetimeFigureOut">
               <a:rPr lang="en-IL" smtClean="0"/>
-              <a:t>24/04/2023</a:t>
+              <a:t>07/05/2023</a:t>
             </a:fld>
             <a:endParaRPr lang="en-IL"/>
           </a:p>
@@ -872,7 +893,7 @@
           <a:p>
             <a:fld id="{56BC5E1A-6555-214D-BE28-650DBB619B37}" type="datetimeFigureOut">
               <a:rPr lang="en-IL" smtClean="0"/>
-              <a:t>24/04/2023</a:t>
+              <a:t>07/05/2023</a:t>
             </a:fld>
             <a:endParaRPr lang="en-IL"/>
           </a:p>
@@ -1148,7 +1169,7 @@
           <a:p>
             <a:fld id="{56BC5E1A-6555-214D-BE28-650DBB619B37}" type="datetimeFigureOut">
               <a:rPr lang="en-IL" smtClean="0"/>
-              <a:t>24/04/2023</a:t>
+              <a:t>07/05/2023</a:t>
             </a:fld>
             <a:endParaRPr lang="en-IL"/>
           </a:p>
@@ -1416,7 +1437,7 @@
           <a:p>
             <a:fld id="{56BC5E1A-6555-214D-BE28-650DBB619B37}" type="datetimeFigureOut">
               <a:rPr lang="en-IL" smtClean="0"/>
-              <a:t>24/04/2023</a:t>
+              <a:t>07/05/2023</a:t>
             </a:fld>
             <a:endParaRPr lang="en-IL"/>
           </a:p>
@@ -1831,7 +1852,7 @@
           <a:p>
             <a:fld id="{56BC5E1A-6555-214D-BE28-650DBB619B37}" type="datetimeFigureOut">
               <a:rPr lang="en-IL" smtClean="0"/>
-              <a:t>24/04/2023</a:t>
+              <a:t>07/05/2023</a:t>
             </a:fld>
             <a:endParaRPr lang="en-IL"/>
           </a:p>
@@ -1973,7 +1994,7 @@
           <a:p>
             <a:fld id="{56BC5E1A-6555-214D-BE28-650DBB619B37}" type="datetimeFigureOut">
               <a:rPr lang="en-IL" smtClean="0"/>
-              <a:t>24/04/2023</a:t>
+              <a:t>07/05/2023</a:t>
             </a:fld>
             <a:endParaRPr lang="en-IL"/>
           </a:p>
@@ -2086,7 +2107,7 @@
           <a:p>
             <a:fld id="{56BC5E1A-6555-214D-BE28-650DBB619B37}" type="datetimeFigureOut">
               <a:rPr lang="en-IL" smtClean="0"/>
-              <a:t>24/04/2023</a:t>
+              <a:t>07/05/2023</a:t>
             </a:fld>
             <a:endParaRPr lang="en-IL"/>
           </a:p>
@@ -2399,7 +2420,7 @@
           <a:p>
             <a:fld id="{56BC5E1A-6555-214D-BE28-650DBB619B37}" type="datetimeFigureOut">
               <a:rPr lang="en-IL" smtClean="0"/>
-              <a:t>24/04/2023</a:t>
+              <a:t>07/05/2023</a:t>
             </a:fld>
             <a:endParaRPr lang="en-IL"/>
           </a:p>
@@ -2688,7 +2709,7 @@
           <a:p>
             <a:fld id="{56BC5E1A-6555-214D-BE28-650DBB619B37}" type="datetimeFigureOut">
               <a:rPr lang="en-IL" smtClean="0"/>
-              <a:t>24/04/2023</a:t>
+              <a:t>07/05/2023</a:t>
             </a:fld>
             <a:endParaRPr lang="en-IL"/>
           </a:p>
@@ -2931,7 +2952,7 @@
           <a:p>
             <a:fld id="{56BC5E1A-6555-214D-BE28-650DBB619B37}" type="datetimeFigureOut">
               <a:rPr lang="en-IL" smtClean="0"/>
-              <a:t>24/04/2023</a:t>
+              <a:t>07/05/2023</a:t>
             </a:fld>
             <a:endParaRPr lang="en-IL"/>
           </a:p>
@@ -3411,6 +3432,1845 @@
 </p:sld>
 </file>
 
+<file path=ppt/slides/slide10.xml><?xml version="1.0" encoding="utf-8"?>
+<p:sld xmlns:a="http://schemas.openxmlformats.org/drawingml/2006/main" xmlns:r="http://schemas.openxmlformats.org/officeDocument/2006/relationships" xmlns:p="http://schemas.openxmlformats.org/presentationml/2006/main">
+  <p:cSld>
+    <p:bg>
+      <p:bgPr>
+        <a:solidFill>
+          <a:schemeClr val="bg1"/>
+        </a:solidFill>
+        <a:effectLst/>
+      </p:bgPr>
+    </p:bg>
+    <p:spTree>
+      <p:nvGrpSpPr>
+        <p:cNvPr id="1" name=""/>
+        <p:cNvGrpSpPr/>
+        <p:nvPr/>
+      </p:nvGrpSpPr>
+      <p:grpSpPr>
+        <a:xfrm>
+          <a:off x="0" y="0"/>
+          <a:ext cx="0" cy="0"/>
+          <a:chOff x="0" y="0"/>
+          <a:chExt cx="0" cy="0"/>
+        </a:xfrm>
+      </p:grpSpPr>
+      <p:sp>
+        <p:nvSpPr>
+          <p:cNvPr id="10" name="Rectangle 9">
+            <a:extLst>
+              <a:ext uri="{FF2B5EF4-FFF2-40B4-BE49-F238E27FC236}">
+                <a16:creationId xmlns:a16="http://schemas.microsoft.com/office/drawing/2014/main" id="{A4AC5506-6312-4701-8D3C-40187889A947}"/>
+              </a:ext>
+              <a:ext uri="{C183D7F6-B498-43B3-948B-1728B52AA6E4}">
+                <adec:decorative xmlns:adec="http://schemas.microsoft.com/office/drawing/2017/decorative" val="1"/>
+              </a:ext>
+            </a:extLst>
+          </p:cNvPr>
+          <p:cNvSpPr>
+            <a:spLocks noGrp="1" noRot="1" noChangeAspect="1" noMove="1" noResize="1" noEditPoints="1" noAdjustHandles="1" noChangeArrowheads="1" noChangeShapeType="1" noTextEdit="1"/>
+          </p:cNvSpPr>
+          <p:nvPr>
+            <p:extLst>
+              <p:ext uri="{386F3935-93C4-4BCD-93E2-E3B085C9AB24}">
+                <p16:designElem xmlns:p16="http://schemas.microsoft.com/office/powerpoint/2015/main" val="1"/>
+              </p:ext>
+            </p:extLst>
+          </p:nvPr>
+        </p:nvSpPr>
+        <p:spPr>
+          <a:xfrm>
+            <a:off x="0" y="651752"/>
+            <a:ext cx="12192000" cy="736551"/>
+          </a:xfrm>
+          <a:prstGeom prst="rect">
+            <a:avLst/>
+          </a:prstGeom>
+          <a:solidFill>
+            <a:schemeClr val="tx1"/>
+          </a:solidFill>
+          <a:ln>
+            <a:noFill/>
+          </a:ln>
+        </p:spPr>
+        <p:style>
+          <a:lnRef idx="2">
+            <a:schemeClr val="accent1">
+              <a:shade val="50000"/>
+            </a:schemeClr>
+          </a:lnRef>
+          <a:fillRef idx="1">
+            <a:schemeClr val="accent1"/>
+          </a:fillRef>
+          <a:effectRef idx="0">
+            <a:schemeClr val="accent1"/>
+          </a:effectRef>
+          <a:fontRef idx="minor">
+            <a:schemeClr val="lt1"/>
+          </a:fontRef>
+        </p:style>
+        <p:txBody>
+          <a:bodyPr rtlCol="0" anchor="ctr"/>
+          <a:lstStyle/>
+          <a:p>
+            <a:pPr algn="ctr"/>
+            <a:endParaRPr lang="en-US"/>
+          </a:p>
+        </p:txBody>
+      </p:sp>
+      <p:sp>
+        <p:nvSpPr>
+          <p:cNvPr id="2" name="Title 1">
+            <a:extLst>
+              <a:ext uri="{FF2B5EF4-FFF2-40B4-BE49-F238E27FC236}">
+                <a16:creationId xmlns:a16="http://schemas.microsoft.com/office/drawing/2014/main" id="{05177CD8-1577-1B43-6A99-F30DDB7D00C4}"/>
+              </a:ext>
+            </a:extLst>
+          </p:cNvPr>
+          <p:cNvSpPr>
+            <a:spLocks noGrp="1"/>
+          </p:cNvSpPr>
+          <p:nvPr>
+            <p:ph type="title"/>
+          </p:nvPr>
+        </p:nvSpPr>
+        <p:spPr>
+          <a:xfrm>
+            <a:off x="556532" y="643467"/>
+            <a:ext cx="11210925" cy="744836"/>
+          </a:xfrm>
+        </p:spPr>
+        <p:txBody>
+          <a:bodyPr vert="horz" lIns="91440" tIns="45720" rIns="91440" bIns="45720" rtlCol="0" anchor="ctr">
+            <a:normAutofit/>
+          </a:bodyPr>
+          <a:lstStyle/>
+          <a:p>
+            <a:pPr algn="ctr"/>
+            <a:r>
+              <a:rPr lang="en-US" sz="3200" kern="1200">
+                <a:solidFill>
+                  <a:schemeClr val="bg1"/>
+                </a:solidFill>
+                <a:latin typeface="+mj-lt"/>
+                <a:ea typeface="+mj-ea"/>
+                <a:cs typeface="+mj-cs"/>
+              </a:rPr>
+              <a:t>Wait what with null and undefiend</a:t>
+            </a:r>
+          </a:p>
+        </p:txBody>
+      </p:sp>
+      <p:pic>
+        <p:nvPicPr>
+          <p:cNvPr id="5" name="Content Placeholder 4" descr="Graphical user interface, text, application&#10;&#10;Description automatically generated">
+            <a:extLst>
+              <a:ext uri="{FF2B5EF4-FFF2-40B4-BE49-F238E27FC236}">
+                <a16:creationId xmlns:a16="http://schemas.microsoft.com/office/drawing/2014/main" id="{3EBB089B-1D67-748C-5A50-23EDBEC5B961}"/>
+              </a:ext>
+            </a:extLst>
+          </p:cNvPr>
+          <p:cNvPicPr>
+            <a:picLocks noGrp="1" noChangeAspect="1"/>
+          </p:cNvPicPr>
+          <p:nvPr>
+            <p:ph idx="1"/>
+          </p:nvPr>
+        </p:nvPicPr>
+        <p:blipFill>
+          <a:blip r:embed="rId2"/>
+          <a:stretch>
+            <a:fillRect/>
+          </a:stretch>
+        </p:blipFill>
+        <p:spPr>
+          <a:xfrm>
+            <a:off x="2155014" y="1675227"/>
+            <a:ext cx="7881971" cy="4394199"/>
+          </a:xfrm>
+          <a:prstGeom prst="rect">
+            <a:avLst/>
+          </a:prstGeom>
+        </p:spPr>
+      </p:pic>
+    </p:spTree>
+    <p:extLst>
+      <p:ext uri="{BB962C8B-B14F-4D97-AF65-F5344CB8AC3E}">
+        <p14:creationId xmlns:p14="http://schemas.microsoft.com/office/powerpoint/2010/main" val="360308877"/>
+      </p:ext>
+    </p:extLst>
+  </p:cSld>
+  <p:clrMapOvr>
+    <a:masterClrMapping/>
+  </p:clrMapOvr>
+</p:sld>
+</file>
+
+<file path=ppt/slides/slide11.xml><?xml version="1.0" encoding="utf-8"?>
+<p:sld xmlns:a="http://schemas.openxmlformats.org/drawingml/2006/main" xmlns:r="http://schemas.openxmlformats.org/officeDocument/2006/relationships" xmlns:p="http://schemas.openxmlformats.org/presentationml/2006/main">
+  <p:cSld>
+    <p:spTree>
+      <p:nvGrpSpPr>
+        <p:cNvPr id="1" name=""/>
+        <p:cNvGrpSpPr/>
+        <p:nvPr/>
+      </p:nvGrpSpPr>
+      <p:grpSpPr>
+        <a:xfrm>
+          <a:off x="0" y="0"/>
+          <a:ext cx="0" cy="0"/>
+          <a:chOff x="0" y="0"/>
+          <a:chExt cx="0" cy="0"/>
+        </a:xfrm>
+      </p:grpSpPr>
+      <p:sp>
+        <p:nvSpPr>
+          <p:cNvPr id="2" name="Title 1">
+            <a:extLst>
+              <a:ext uri="{FF2B5EF4-FFF2-40B4-BE49-F238E27FC236}">
+                <a16:creationId xmlns:a16="http://schemas.microsoft.com/office/drawing/2014/main" id="{05177CD8-1577-1B43-6A99-F30DDB7D00C4}"/>
+              </a:ext>
+            </a:extLst>
+          </p:cNvPr>
+          <p:cNvSpPr>
+            <a:spLocks noGrp="1"/>
+          </p:cNvSpPr>
+          <p:nvPr>
+            <p:ph type="title"/>
+          </p:nvPr>
+        </p:nvSpPr>
+        <p:spPr/>
+        <p:txBody>
+          <a:bodyPr/>
+          <a:lstStyle/>
+          <a:p>
+            <a:r>
+              <a:rPr lang="en-IL" dirty="0"/>
+              <a:t>SQL</a:t>
+            </a:r>
+          </a:p>
+        </p:txBody>
+      </p:sp>
+      <p:sp>
+        <p:nvSpPr>
+          <p:cNvPr id="3" name="Content Placeholder 2">
+            <a:extLst>
+              <a:ext uri="{FF2B5EF4-FFF2-40B4-BE49-F238E27FC236}">
+                <a16:creationId xmlns:a16="http://schemas.microsoft.com/office/drawing/2014/main" id="{85368711-2939-027B-EE1D-0F7E948016DF}"/>
+              </a:ext>
+            </a:extLst>
+          </p:cNvPr>
+          <p:cNvSpPr>
+            <a:spLocks noGrp="1"/>
+          </p:cNvSpPr>
+          <p:nvPr>
+            <p:ph idx="1"/>
+          </p:nvPr>
+        </p:nvSpPr>
+        <p:spPr/>
+        <p:txBody>
+          <a:bodyPr/>
+          <a:lstStyle/>
+          <a:p>
+            <a:r>
+              <a:rPr lang="en-US" dirty="0"/>
+              <a:t>SQL (Structured Query Language) is a programming language designed for managing and manipulating relational databases. It is widely used in modern data-driven applications to interact with and retrieve data from databases. SQL is a declarative language, meaning that you specify what you want to retrieve or manipulate from the database, and the database management system (DBMS) figures out how to execute your request.</a:t>
+            </a:r>
+          </a:p>
+        </p:txBody>
+      </p:sp>
+    </p:spTree>
+    <p:extLst>
+      <p:ext uri="{BB962C8B-B14F-4D97-AF65-F5344CB8AC3E}">
+        <p14:creationId xmlns:p14="http://schemas.microsoft.com/office/powerpoint/2010/main" val="3161341708"/>
+      </p:ext>
+    </p:extLst>
+  </p:cSld>
+  <p:clrMapOvr>
+    <a:masterClrMapping/>
+  </p:clrMapOvr>
+</p:sld>
+</file>
+
+<file path=ppt/slides/slide12.xml><?xml version="1.0" encoding="utf-8"?>
+<p:sld xmlns:a="http://schemas.openxmlformats.org/drawingml/2006/main" xmlns:r="http://schemas.openxmlformats.org/officeDocument/2006/relationships" xmlns:p="http://schemas.openxmlformats.org/presentationml/2006/main">
+  <p:cSld>
+    <p:spTree>
+      <p:nvGrpSpPr>
+        <p:cNvPr id="1" name=""/>
+        <p:cNvGrpSpPr/>
+        <p:nvPr/>
+      </p:nvGrpSpPr>
+      <p:grpSpPr>
+        <a:xfrm>
+          <a:off x="0" y="0"/>
+          <a:ext cx="0" cy="0"/>
+          <a:chOff x="0" y="0"/>
+          <a:chExt cx="0" cy="0"/>
+        </a:xfrm>
+      </p:grpSpPr>
+      <p:sp>
+        <p:nvSpPr>
+          <p:cNvPr id="2" name="Title 1">
+            <a:extLst>
+              <a:ext uri="{FF2B5EF4-FFF2-40B4-BE49-F238E27FC236}">
+                <a16:creationId xmlns:a16="http://schemas.microsoft.com/office/drawing/2014/main" id="{05177CD8-1577-1B43-6A99-F30DDB7D00C4}"/>
+              </a:ext>
+            </a:extLst>
+          </p:cNvPr>
+          <p:cNvSpPr>
+            <a:spLocks noGrp="1"/>
+          </p:cNvSpPr>
+          <p:nvPr>
+            <p:ph type="title"/>
+          </p:nvPr>
+        </p:nvSpPr>
+        <p:spPr/>
+        <p:txBody>
+          <a:bodyPr/>
+          <a:lstStyle/>
+          <a:p>
+            <a:r>
+              <a:rPr lang="en-IL" dirty="0"/>
+              <a:t>SQL - 2</a:t>
+            </a:r>
+          </a:p>
+        </p:txBody>
+      </p:sp>
+      <p:sp>
+        <p:nvSpPr>
+          <p:cNvPr id="3" name="Content Placeholder 2">
+            <a:extLst>
+              <a:ext uri="{FF2B5EF4-FFF2-40B4-BE49-F238E27FC236}">
+                <a16:creationId xmlns:a16="http://schemas.microsoft.com/office/drawing/2014/main" id="{85368711-2939-027B-EE1D-0F7E948016DF}"/>
+              </a:ext>
+            </a:extLst>
+          </p:cNvPr>
+          <p:cNvSpPr>
+            <a:spLocks noGrp="1"/>
+          </p:cNvSpPr>
+          <p:nvPr>
+            <p:ph idx="1"/>
+          </p:nvPr>
+        </p:nvSpPr>
+        <p:spPr/>
+        <p:txBody>
+          <a:bodyPr>
+            <a:normAutofit lnSpcReduction="10000"/>
+          </a:bodyPr>
+          <a:lstStyle/>
+          <a:p>
+            <a:pPr algn="l"/>
+            <a:r>
+              <a:rPr lang="en-US" b="0" i="0" dirty="0">
+                <a:effectLst/>
+                <a:latin typeface="Söhne"/>
+              </a:rPr>
+              <a:t>Some common tasks that can be accomplished using SQL include:</a:t>
+            </a:r>
+          </a:p>
+          <a:p>
+            <a:pPr algn="l">
+              <a:buFont typeface="Arial" panose="020B0604020202020204" pitchFamily="34" charset="0"/>
+              <a:buChar char="•"/>
+            </a:pPr>
+            <a:r>
+              <a:rPr lang="en-US" b="0" i="0" dirty="0">
+                <a:effectLst/>
+                <a:latin typeface="Söhne"/>
+              </a:rPr>
+              <a:t>Creating and modifying tables: You can use SQL to create new tables in a database, modify existing tables, or delete tables altogether.</a:t>
+            </a:r>
+          </a:p>
+          <a:p>
+            <a:pPr algn="l">
+              <a:buFont typeface="Arial" panose="020B0604020202020204" pitchFamily="34" charset="0"/>
+              <a:buChar char="•"/>
+            </a:pPr>
+            <a:r>
+              <a:rPr lang="en-US" b="0" i="0" dirty="0">
+                <a:effectLst/>
+                <a:latin typeface="Söhne"/>
+              </a:rPr>
+              <a:t>Inserting and updating data: You can use SQL to add new rows to a table, modify existing rows, or delete rows from a table.</a:t>
+            </a:r>
+          </a:p>
+          <a:p>
+            <a:pPr algn="l">
+              <a:buFont typeface="Arial" panose="020B0604020202020204" pitchFamily="34" charset="0"/>
+              <a:buChar char="•"/>
+            </a:pPr>
+            <a:r>
+              <a:rPr lang="en-US" b="0" i="0" dirty="0">
+                <a:effectLst/>
+                <a:latin typeface="Söhne"/>
+              </a:rPr>
+              <a:t>Querying data: You can use SQL to retrieve data from one or more tables in a database, and filter, group, or sort the results in a variety of ways.</a:t>
+            </a:r>
+          </a:p>
+          <a:p>
+            <a:pPr algn="l">
+              <a:buFont typeface="Arial" panose="020B0604020202020204" pitchFamily="34" charset="0"/>
+              <a:buChar char="•"/>
+            </a:pPr>
+            <a:r>
+              <a:rPr lang="en-US" b="0" i="0" dirty="0">
+                <a:effectLst/>
+                <a:latin typeface="Söhne"/>
+              </a:rPr>
+              <a:t>Joining tables: You can use SQL to combine data from two or more tables in a database, based on a common field or set of fields.</a:t>
+            </a:r>
+          </a:p>
+        </p:txBody>
+      </p:sp>
+    </p:spTree>
+    <p:extLst>
+      <p:ext uri="{BB962C8B-B14F-4D97-AF65-F5344CB8AC3E}">
+        <p14:creationId xmlns:p14="http://schemas.microsoft.com/office/powerpoint/2010/main" val="1457496235"/>
+      </p:ext>
+    </p:extLst>
+  </p:cSld>
+  <p:clrMapOvr>
+    <a:masterClrMapping/>
+  </p:clrMapOvr>
+</p:sld>
+</file>
+
+<file path=ppt/slides/slide13.xml><?xml version="1.0" encoding="utf-8"?>
+<p:sld xmlns:a="http://schemas.openxmlformats.org/drawingml/2006/main" xmlns:r="http://schemas.openxmlformats.org/officeDocument/2006/relationships" xmlns:p="http://schemas.openxmlformats.org/presentationml/2006/main">
+  <p:cSld>
+    <p:spTree>
+      <p:nvGrpSpPr>
+        <p:cNvPr id="1" name=""/>
+        <p:cNvGrpSpPr/>
+        <p:nvPr/>
+      </p:nvGrpSpPr>
+      <p:grpSpPr>
+        <a:xfrm>
+          <a:off x="0" y="0"/>
+          <a:ext cx="0" cy="0"/>
+          <a:chOff x="0" y="0"/>
+          <a:chExt cx="0" cy="0"/>
+        </a:xfrm>
+      </p:grpSpPr>
+      <p:sp>
+        <p:nvSpPr>
+          <p:cNvPr id="2" name="Title 1">
+            <a:extLst>
+              <a:ext uri="{FF2B5EF4-FFF2-40B4-BE49-F238E27FC236}">
+                <a16:creationId xmlns:a16="http://schemas.microsoft.com/office/drawing/2014/main" id="{7747068A-F79B-AE06-658B-4D7ECEA0D6A8}"/>
+              </a:ext>
+            </a:extLst>
+          </p:cNvPr>
+          <p:cNvSpPr>
+            <a:spLocks noGrp="1"/>
+          </p:cNvSpPr>
+          <p:nvPr>
+            <p:ph type="title"/>
+          </p:nvPr>
+        </p:nvSpPr>
+        <p:spPr/>
+        <p:txBody>
+          <a:bodyPr/>
+          <a:lstStyle/>
+          <a:p>
+            <a:r>
+              <a:rPr lang="en-IL" dirty="0"/>
+              <a:t>SQL - 3</a:t>
+            </a:r>
+          </a:p>
+        </p:txBody>
+      </p:sp>
+      <p:sp>
+        <p:nvSpPr>
+          <p:cNvPr id="3" name="Content Placeholder 2">
+            <a:extLst>
+              <a:ext uri="{FF2B5EF4-FFF2-40B4-BE49-F238E27FC236}">
+                <a16:creationId xmlns:a16="http://schemas.microsoft.com/office/drawing/2014/main" id="{BAC08B16-8910-5841-2F8B-FDEC5D498B8A}"/>
+              </a:ext>
+            </a:extLst>
+          </p:cNvPr>
+          <p:cNvSpPr>
+            <a:spLocks noGrp="1"/>
+          </p:cNvSpPr>
+          <p:nvPr>
+            <p:ph idx="1"/>
+          </p:nvPr>
+        </p:nvSpPr>
+        <p:spPr/>
+        <p:txBody>
+          <a:bodyPr>
+            <a:normAutofit lnSpcReduction="10000"/>
+          </a:bodyPr>
+          <a:lstStyle/>
+          <a:p>
+            <a:pPr algn="l"/>
+            <a:r>
+              <a:rPr lang="en-US" b="0" i="0" dirty="0">
+                <a:effectLst/>
+                <a:latin typeface="Söhne"/>
+              </a:rPr>
+              <a:t>SQL is a standard language, meaning that it is recognized and implemented by most relational database management systems, including MySQL, Oracle, Microsoft SQL Server, and PostgreSQL, among others. This makes it a very powerful tool for working with data in a variety of contexts.</a:t>
+            </a:r>
+          </a:p>
+          <a:p>
+            <a:pPr algn="l"/>
+            <a:r>
+              <a:rPr lang="en-US" b="0" i="0" dirty="0">
+                <a:effectLst/>
+                <a:latin typeface="Söhne"/>
+              </a:rPr>
+              <a:t>To use SQL, you typically interact with a database management system using a client application or a command-line interface. You write SQL statements to perform various operations on the database, and the DBMS responds with the requested data or executes the requested operation. SQL can be used for both simple queries and complex data analysis tasks, making it a versatile tool for working with data in a wide range of applications.</a:t>
+            </a:r>
+          </a:p>
+        </p:txBody>
+      </p:sp>
+    </p:spTree>
+    <p:extLst>
+      <p:ext uri="{BB962C8B-B14F-4D97-AF65-F5344CB8AC3E}">
+        <p14:creationId xmlns:p14="http://schemas.microsoft.com/office/powerpoint/2010/main" val="14288278"/>
+      </p:ext>
+    </p:extLst>
+  </p:cSld>
+  <p:clrMapOvr>
+    <a:masterClrMapping/>
+  </p:clrMapOvr>
+</p:sld>
+</file>
+
+<file path=ppt/slides/slide14.xml><?xml version="1.0" encoding="utf-8"?>
+<p:sld xmlns:a="http://schemas.openxmlformats.org/drawingml/2006/main" xmlns:r="http://schemas.openxmlformats.org/officeDocument/2006/relationships" xmlns:p="http://schemas.openxmlformats.org/presentationml/2006/main">
+  <p:cSld>
+    <p:bg>
+      <p:bgPr>
+        <a:solidFill>
+          <a:schemeClr val="bg1"/>
+        </a:solidFill>
+        <a:effectLst/>
+      </p:bgPr>
+    </p:bg>
+    <p:spTree>
+      <p:nvGrpSpPr>
+        <p:cNvPr id="1" name=""/>
+        <p:cNvGrpSpPr/>
+        <p:nvPr/>
+      </p:nvGrpSpPr>
+      <p:grpSpPr>
+        <a:xfrm>
+          <a:off x="0" y="0"/>
+          <a:ext cx="0" cy="0"/>
+          <a:chOff x="0" y="0"/>
+          <a:chExt cx="0" cy="0"/>
+        </a:xfrm>
+      </p:grpSpPr>
+      <p:sp>
+        <p:nvSpPr>
+          <p:cNvPr id="10" name="Down Arrow 7">
+            <a:extLst>
+              <a:ext uri="{FF2B5EF4-FFF2-40B4-BE49-F238E27FC236}">
+                <a16:creationId xmlns:a16="http://schemas.microsoft.com/office/drawing/2014/main" id="{D4771268-CB57-404A-9271-370EB28F6090}"/>
+              </a:ext>
+              <a:ext uri="{C183D7F6-B498-43B3-948B-1728B52AA6E4}">
+                <adec:decorative xmlns:adec="http://schemas.microsoft.com/office/drawing/2017/decorative" val="1"/>
+              </a:ext>
+            </a:extLst>
+          </p:cNvPr>
+          <p:cNvSpPr>
+            <a:spLocks noGrp="1" noRot="1" noChangeAspect="1" noMove="1" noResize="1" noEditPoints="1" noAdjustHandles="1" noChangeArrowheads="1" noChangeShapeType="1" noTextEdit="1"/>
+          </p:cNvSpPr>
+          <p:nvPr>
+            <p:extLst>
+              <p:ext uri="{386F3935-93C4-4BCD-93E2-E3B085C9AB24}">
+                <p16:designElem xmlns:p16="http://schemas.microsoft.com/office/powerpoint/2015/main" val="1"/>
+              </p:ext>
+            </p:extLst>
+          </p:nvPr>
+        </p:nvSpPr>
+        <p:spPr>
+          <a:xfrm rot="16200000">
+            <a:off x="800100" y="1491343"/>
+            <a:ext cx="3333749" cy="3499103"/>
+          </a:xfrm>
+          <a:prstGeom prst="downArrow">
+            <a:avLst>
+              <a:gd name="adj1" fmla="val 100000"/>
+              <a:gd name="adj2" fmla="val 15788"/>
+            </a:avLst>
+          </a:prstGeom>
+          <a:solidFill>
+            <a:srgbClr val="404040"/>
+          </a:solidFill>
+          <a:ln w="53975">
+            <a:noFill/>
+          </a:ln>
+        </p:spPr>
+        <p:style>
+          <a:lnRef idx="2">
+            <a:schemeClr val="accent1">
+              <a:shade val="50000"/>
+            </a:schemeClr>
+          </a:lnRef>
+          <a:fillRef idx="1">
+            <a:schemeClr val="accent1"/>
+          </a:fillRef>
+          <a:effectRef idx="0">
+            <a:schemeClr val="accent1"/>
+          </a:effectRef>
+          <a:fontRef idx="minor">
+            <a:schemeClr val="lt1"/>
+          </a:fontRef>
+        </p:style>
+        <p:txBody>
+          <a:bodyPr rtlCol="0" anchor="ctr"/>
+          <a:lstStyle/>
+          <a:p>
+            <a:pPr algn="ctr"/>
+            <a:endParaRPr lang="en-US"/>
+          </a:p>
+        </p:txBody>
+      </p:sp>
+      <p:sp>
+        <p:nvSpPr>
+          <p:cNvPr id="2" name="Title 1">
+            <a:extLst>
+              <a:ext uri="{FF2B5EF4-FFF2-40B4-BE49-F238E27FC236}">
+                <a16:creationId xmlns:a16="http://schemas.microsoft.com/office/drawing/2014/main" id="{7747068A-F79B-AE06-658B-4D7ECEA0D6A8}"/>
+              </a:ext>
+            </a:extLst>
+          </p:cNvPr>
+          <p:cNvSpPr>
+            <a:spLocks noGrp="1"/>
+          </p:cNvSpPr>
+          <p:nvPr>
+            <p:ph type="title"/>
+          </p:nvPr>
+        </p:nvSpPr>
+        <p:spPr>
+          <a:xfrm>
+            <a:off x="1028700" y="1967266"/>
+            <a:ext cx="2628900" cy="2547257"/>
+          </a:xfrm>
+          <a:noFill/>
+        </p:spPr>
+        <p:txBody>
+          <a:bodyPr vert="horz" lIns="91440" tIns="45720" rIns="91440" bIns="45720" rtlCol="0" anchor="ctr">
+            <a:normAutofit/>
+          </a:bodyPr>
+          <a:lstStyle/>
+          <a:p>
+            <a:pPr algn="ctr"/>
+            <a:r>
+              <a:rPr lang="en-US" sz="3600" kern="1200">
+                <a:solidFill>
+                  <a:srgbClr val="FFFFFF"/>
+                </a:solidFill>
+                <a:latin typeface="+mj-lt"/>
+                <a:ea typeface="+mj-ea"/>
+                <a:cs typeface="+mj-cs"/>
+              </a:rPr>
+              <a:t>SQL versions</a:t>
+            </a:r>
+          </a:p>
+        </p:txBody>
+      </p:sp>
+      <p:pic>
+        <p:nvPicPr>
+          <p:cNvPr id="5" name="Content Placeholder 4" descr="A picture containing text, font, screenshot, graphics&#10;&#10;Description automatically generated">
+            <a:extLst>
+              <a:ext uri="{FF2B5EF4-FFF2-40B4-BE49-F238E27FC236}">
+                <a16:creationId xmlns:a16="http://schemas.microsoft.com/office/drawing/2014/main" id="{7810228E-DD38-5F30-768C-5072F1B0883F}"/>
+              </a:ext>
+            </a:extLst>
+          </p:cNvPr>
+          <p:cNvPicPr>
+            <a:picLocks noGrp="1" noChangeAspect="1"/>
+          </p:cNvPicPr>
+          <p:nvPr>
+            <p:ph idx="1"/>
+          </p:nvPr>
+        </p:nvPicPr>
+        <p:blipFill>
+          <a:blip r:embed="rId2"/>
+          <a:stretch>
+            <a:fillRect/>
+          </a:stretch>
+        </p:blipFill>
+        <p:spPr>
+          <a:xfrm>
+            <a:off x="5731343" y="643466"/>
+            <a:ext cx="4872645" cy="5568739"/>
+          </a:xfrm>
+          <a:prstGeom prst="rect">
+            <a:avLst/>
+          </a:prstGeom>
+        </p:spPr>
+      </p:pic>
+    </p:spTree>
+    <p:extLst>
+      <p:ext uri="{BB962C8B-B14F-4D97-AF65-F5344CB8AC3E}">
+        <p14:creationId xmlns:p14="http://schemas.microsoft.com/office/powerpoint/2010/main" val="1598314977"/>
+      </p:ext>
+    </p:extLst>
+  </p:cSld>
+  <p:clrMapOvr>
+    <a:masterClrMapping/>
+  </p:clrMapOvr>
+</p:sld>
+</file>
+
+<file path=ppt/slides/slide15.xml><?xml version="1.0" encoding="utf-8"?>
+<p:sld xmlns:a="http://schemas.openxmlformats.org/drawingml/2006/main" xmlns:r="http://schemas.openxmlformats.org/officeDocument/2006/relationships" xmlns:p="http://schemas.openxmlformats.org/presentationml/2006/main">
+  <p:cSld>
+    <p:spTree>
+      <p:nvGrpSpPr>
+        <p:cNvPr id="1" name=""/>
+        <p:cNvGrpSpPr/>
+        <p:nvPr/>
+      </p:nvGrpSpPr>
+      <p:grpSpPr>
+        <a:xfrm>
+          <a:off x="0" y="0"/>
+          <a:ext cx="0" cy="0"/>
+          <a:chOff x="0" y="0"/>
+          <a:chExt cx="0" cy="0"/>
+        </a:xfrm>
+      </p:grpSpPr>
+      <p:sp>
+        <p:nvSpPr>
+          <p:cNvPr id="2" name="Title 1">
+            <a:extLst>
+              <a:ext uri="{FF2B5EF4-FFF2-40B4-BE49-F238E27FC236}">
+                <a16:creationId xmlns:a16="http://schemas.microsoft.com/office/drawing/2014/main" id="{7747068A-F79B-AE06-658B-4D7ECEA0D6A8}"/>
+              </a:ext>
+            </a:extLst>
+          </p:cNvPr>
+          <p:cNvSpPr>
+            <a:spLocks noGrp="1"/>
+          </p:cNvSpPr>
+          <p:nvPr>
+            <p:ph type="title"/>
+          </p:nvPr>
+        </p:nvSpPr>
+        <p:spPr/>
+        <p:txBody>
+          <a:bodyPr/>
+          <a:lstStyle/>
+          <a:p>
+            <a:r>
+              <a:rPr lang="en-US" dirty="0"/>
+              <a:t>W</a:t>
+            </a:r>
+            <a:r>
+              <a:rPr lang="en-IL" dirty="0"/>
+              <a:t>hich one is the best</a:t>
+            </a:r>
+          </a:p>
+        </p:txBody>
+      </p:sp>
+      <p:sp>
+        <p:nvSpPr>
+          <p:cNvPr id="3" name="Content Placeholder 2">
+            <a:extLst>
+              <a:ext uri="{FF2B5EF4-FFF2-40B4-BE49-F238E27FC236}">
+                <a16:creationId xmlns:a16="http://schemas.microsoft.com/office/drawing/2014/main" id="{BAC08B16-8910-5841-2F8B-FDEC5D498B8A}"/>
+              </a:ext>
+            </a:extLst>
+          </p:cNvPr>
+          <p:cNvSpPr>
+            <a:spLocks noGrp="1"/>
+          </p:cNvSpPr>
+          <p:nvPr>
+            <p:ph idx="1"/>
+          </p:nvPr>
+        </p:nvSpPr>
+        <p:spPr/>
+        <p:txBody>
+          <a:bodyPr>
+            <a:normAutofit fontScale="62500" lnSpcReduction="20000"/>
+          </a:bodyPr>
+          <a:lstStyle/>
+          <a:p>
+            <a:pPr algn="l"/>
+            <a:r>
+              <a:rPr lang="en-US" b="0" i="0" dirty="0">
+                <a:effectLst/>
+                <a:latin typeface="Söhne"/>
+              </a:rPr>
+              <a:t>There are several different types of SQL database management systems (DBMS) available, each with its own strengths and weaknesses. Here are some of the most popular SQL database systems:</a:t>
+            </a:r>
+          </a:p>
+          <a:p>
+            <a:pPr algn="l">
+              <a:buFont typeface="+mj-lt"/>
+              <a:buAutoNum type="arabicPeriod"/>
+            </a:pPr>
+            <a:r>
+              <a:rPr lang="en-US" b="0" i="0" dirty="0">
+                <a:effectLst/>
+                <a:latin typeface="Söhne"/>
+              </a:rPr>
+              <a:t>MySQL: MySQL is an open-source DBMS that is widely used for web applications. It's known for its scalability, performance, and ease of use. MySQL is often used in conjunction with other open-source technologies, such as PHP and Apache, to build web applications.</a:t>
+            </a:r>
+          </a:p>
+          <a:p>
+            <a:pPr algn="l">
+              <a:buFont typeface="+mj-lt"/>
+              <a:buAutoNum type="arabicPeriod"/>
+            </a:pPr>
+            <a:r>
+              <a:rPr lang="en-US" b="0" i="0" dirty="0">
+                <a:effectLst/>
+                <a:latin typeface="Söhne"/>
+              </a:rPr>
+              <a:t>PostgreSQL: PostgreSQL is an open-source DBMS that is known for its robustness, extensibility, and support for advanced SQL features. It's often used for enterprise applications and is considered to be one of the most powerful and capable SQL databases available.</a:t>
+            </a:r>
+          </a:p>
+          <a:p>
+            <a:pPr algn="l">
+              <a:buFont typeface="+mj-lt"/>
+              <a:buAutoNum type="arabicPeriod"/>
+            </a:pPr>
+            <a:r>
+              <a:rPr lang="en-US" b="0" i="0" dirty="0">
+                <a:effectLst/>
+                <a:latin typeface="Söhne"/>
+              </a:rPr>
+              <a:t>Microsoft SQL Server: Microsoft SQL Server is a proprietary DBMS that is widely used in enterprise environments, particularly in Windows-based environments. It's known for its scalability, reliability, and support for advanced features such as high availability and data warehousing.</a:t>
+            </a:r>
+          </a:p>
+          <a:p>
+            <a:pPr algn="l">
+              <a:buFont typeface="+mj-lt"/>
+              <a:buAutoNum type="arabicPeriod"/>
+            </a:pPr>
+            <a:r>
+              <a:rPr lang="en-US" b="0" i="0" dirty="0">
+                <a:effectLst/>
+                <a:latin typeface="Söhne"/>
+              </a:rPr>
+              <a:t>Oracle: Oracle is a proprietary DBMS that is widely used in enterprise environments for mission-critical applications. It's known for its scalability, performance, and support for advanced features such as data warehousing and business intelligence.</a:t>
+            </a:r>
+          </a:p>
+          <a:p>
+            <a:pPr algn="l">
+              <a:buFont typeface="+mj-lt"/>
+              <a:buAutoNum type="arabicPeriod"/>
+            </a:pPr>
+            <a:r>
+              <a:rPr lang="en-US" b="0" i="0" dirty="0">
+                <a:effectLst/>
+                <a:latin typeface="Söhne"/>
+              </a:rPr>
+              <a:t>SQLite: SQLite is a lightweight, open-source DBMS that is often used in mobile applications and embedded systems. It's known for its simplicity, speed, and small size.</a:t>
+            </a:r>
+          </a:p>
+          <a:p>
+            <a:pPr algn="l">
+              <a:buFont typeface="+mj-lt"/>
+              <a:buAutoNum type="arabicPeriod"/>
+            </a:pPr>
+            <a:r>
+              <a:rPr lang="en-US" b="0" i="0" dirty="0">
+                <a:effectLst/>
+                <a:latin typeface="Söhne"/>
+              </a:rPr>
+              <a:t>MariaDB: MariaDB is a community-developed fork of MySQL that aims to be a drop-in replacement for MySQL. It's known for its performance, scalability, and open-source nature.</a:t>
+            </a:r>
+          </a:p>
+        </p:txBody>
+      </p:sp>
+    </p:spTree>
+    <p:extLst>
+      <p:ext uri="{BB962C8B-B14F-4D97-AF65-F5344CB8AC3E}">
+        <p14:creationId xmlns:p14="http://schemas.microsoft.com/office/powerpoint/2010/main" val="3835492041"/>
+      </p:ext>
+    </p:extLst>
+  </p:cSld>
+  <p:clrMapOvr>
+    <a:masterClrMapping/>
+  </p:clrMapOvr>
+</p:sld>
+</file>
+
+<file path=ppt/slides/slide16.xml><?xml version="1.0" encoding="utf-8"?>
+<p:sld xmlns:a="http://schemas.openxmlformats.org/drawingml/2006/main" xmlns:r="http://schemas.openxmlformats.org/officeDocument/2006/relationships" xmlns:p="http://schemas.openxmlformats.org/presentationml/2006/main">
+  <p:cSld>
+    <p:spTree>
+      <p:nvGrpSpPr>
+        <p:cNvPr id="1" name=""/>
+        <p:cNvGrpSpPr/>
+        <p:nvPr/>
+      </p:nvGrpSpPr>
+      <p:grpSpPr>
+        <a:xfrm>
+          <a:off x="0" y="0"/>
+          <a:ext cx="0" cy="0"/>
+          <a:chOff x="0" y="0"/>
+          <a:chExt cx="0" cy="0"/>
+        </a:xfrm>
+      </p:grpSpPr>
+      <p:sp>
+        <p:nvSpPr>
+          <p:cNvPr id="2" name="Title 1">
+            <a:extLst>
+              <a:ext uri="{FF2B5EF4-FFF2-40B4-BE49-F238E27FC236}">
+                <a16:creationId xmlns:a16="http://schemas.microsoft.com/office/drawing/2014/main" id="{7747068A-F79B-AE06-658B-4D7ECEA0D6A8}"/>
+              </a:ext>
+            </a:extLst>
+          </p:cNvPr>
+          <p:cNvSpPr>
+            <a:spLocks noGrp="1"/>
+          </p:cNvSpPr>
+          <p:nvPr>
+            <p:ph type="title"/>
+          </p:nvPr>
+        </p:nvSpPr>
+        <p:spPr/>
+        <p:txBody>
+          <a:bodyPr/>
+          <a:lstStyle/>
+          <a:p>
+            <a:r>
+              <a:rPr lang="en-US" dirty="0"/>
+              <a:t>install PostgreSQL</a:t>
+            </a:r>
+            <a:endParaRPr lang="en-IL" dirty="0"/>
+          </a:p>
+        </p:txBody>
+      </p:sp>
+      <p:sp>
+        <p:nvSpPr>
+          <p:cNvPr id="3" name="Content Placeholder 2">
+            <a:extLst>
+              <a:ext uri="{FF2B5EF4-FFF2-40B4-BE49-F238E27FC236}">
+                <a16:creationId xmlns:a16="http://schemas.microsoft.com/office/drawing/2014/main" id="{BAC08B16-8910-5841-2F8B-FDEC5D498B8A}"/>
+              </a:ext>
+            </a:extLst>
+          </p:cNvPr>
+          <p:cNvSpPr>
+            <a:spLocks noGrp="1"/>
+          </p:cNvSpPr>
+          <p:nvPr>
+            <p:ph idx="1"/>
+          </p:nvPr>
+        </p:nvSpPr>
+        <p:spPr/>
+        <p:txBody>
+          <a:bodyPr>
+            <a:normAutofit fontScale="92500" lnSpcReduction="20000"/>
+          </a:bodyPr>
+          <a:lstStyle/>
+          <a:p>
+            <a:pPr algn="l">
+              <a:buFont typeface="+mj-lt"/>
+              <a:buAutoNum type="arabicPeriod"/>
+            </a:pPr>
+            <a:r>
+              <a:rPr lang="en-US" sz="1800" b="0" i="0" dirty="0">
+                <a:effectLst/>
+                <a:latin typeface="Söhne"/>
+              </a:rPr>
+              <a:t>Download and install PostgreSQL:</a:t>
+            </a:r>
+          </a:p>
+          <a:p>
+            <a:pPr marL="742950" lvl="1" indent="-285750" algn="l">
+              <a:buFont typeface="+mj-lt"/>
+              <a:buAutoNum type="arabicPeriod"/>
+            </a:pPr>
+            <a:r>
+              <a:rPr lang="en-US" sz="1400" b="0" i="0" dirty="0">
+                <a:effectLst/>
+                <a:latin typeface="Söhne"/>
+              </a:rPr>
+              <a:t>For Windows: Download the installer from the PostgreSQL website and run it to install PostgreSQL.</a:t>
+            </a:r>
+          </a:p>
+          <a:p>
+            <a:pPr marL="742950" lvl="1" indent="-285750" algn="l">
+              <a:buFont typeface="+mj-lt"/>
+              <a:buAutoNum type="arabicPeriod"/>
+            </a:pPr>
+            <a:r>
+              <a:rPr lang="en-US" sz="1400" b="0" i="0" dirty="0">
+                <a:effectLst/>
+                <a:latin typeface="Söhne"/>
+              </a:rPr>
+              <a:t>For macOS: You can use Homebrew to install PostgreSQL. Open a terminal and run the command brew install </a:t>
+            </a:r>
+            <a:r>
+              <a:rPr lang="en-US" sz="1400" b="0" i="0" dirty="0" err="1">
+                <a:effectLst/>
+                <a:latin typeface="Söhne"/>
+              </a:rPr>
+              <a:t>postgresql</a:t>
+            </a:r>
+            <a:r>
+              <a:rPr lang="en-US" sz="1400" b="0" i="0" dirty="0">
+                <a:effectLst/>
+                <a:latin typeface="Söhne"/>
+              </a:rPr>
+              <a:t>.</a:t>
+            </a:r>
+          </a:p>
+          <a:p>
+            <a:pPr marL="742950" lvl="1" indent="-285750" algn="l">
+              <a:buFont typeface="+mj-lt"/>
+              <a:buAutoNum type="arabicPeriod"/>
+            </a:pPr>
+            <a:r>
+              <a:rPr lang="en-US" sz="1400" b="0" i="0" dirty="0">
+                <a:effectLst/>
+                <a:latin typeface="Söhne"/>
+              </a:rPr>
+              <a:t>For Linux: You can install PostgreSQL using your distribution's package manager. For example, on Ubuntu, you can run the command </a:t>
+            </a:r>
+            <a:r>
+              <a:rPr lang="en-US" sz="1400" b="0" i="0" dirty="0" err="1">
+                <a:effectLst/>
+                <a:latin typeface="Söhne"/>
+              </a:rPr>
+              <a:t>sudo</a:t>
+            </a:r>
+            <a:r>
+              <a:rPr lang="en-US" sz="1400" b="0" i="0" dirty="0">
+                <a:effectLst/>
+                <a:latin typeface="Söhne"/>
+              </a:rPr>
+              <a:t> apt-get install </a:t>
+            </a:r>
+            <a:r>
+              <a:rPr lang="en-US" sz="1400" b="0" i="0" dirty="0" err="1">
+                <a:effectLst/>
+                <a:latin typeface="Söhne"/>
+              </a:rPr>
+              <a:t>postgresql</a:t>
+            </a:r>
+            <a:r>
+              <a:rPr lang="en-US" sz="1400" b="0" i="0" dirty="0">
+                <a:effectLst/>
+                <a:latin typeface="Söhne"/>
+              </a:rPr>
+              <a:t>.</a:t>
+            </a:r>
+          </a:p>
+          <a:p>
+            <a:pPr algn="l">
+              <a:buFont typeface="+mj-lt"/>
+              <a:buAutoNum type="arabicPeriod"/>
+            </a:pPr>
+            <a:r>
+              <a:rPr lang="en-US" sz="1800" b="0" i="0" dirty="0">
+                <a:effectLst/>
+                <a:latin typeface="Söhne"/>
+              </a:rPr>
+              <a:t>Once PostgreSQL is installed, you can start the PostgreSQL server. On Windows, you can start the PostgreSQL service from the Services app. On macOS and Linux, you can start the PostgreSQL server from the terminal using the command </a:t>
+            </a:r>
+            <a:r>
+              <a:rPr lang="en-US" sz="1800" b="0" i="0" dirty="0" err="1">
+                <a:effectLst/>
+                <a:latin typeface="Söhne"/>
+              </a:rPr>
+              <a:t>sudo</a:t>
+            </a:r>
+            <a:r>
+              <a:rPr lang="en-US" sz="1800" b="0" i="0" dirty="0">
+                <a:effectLst/>
+                <a:latin typeface="Söhne"/>
+              </a:rPr>
+              <a:t> service </a:t>
+            </a:r>
+            <a:r>
+              <a:rPr lang="en-US" sz="1800" b="0" i="0" dirty="0" err="1">
+                <a:effectLst/>
+                <a:latin typeface="Söhne"/>
+              </a:rPr>
+              <a:t>postgresql</a:t>
+            </a:r>
+            <a:r>
+              <a:rPr lang="en-US" sz="1800" b="0" i="0" dirty="0">
+                <a:effectLst/>
+                <a:latin typeface="Söhne"/>
+              </a:rPr>
+              <a:t> start.</a:t>
+            </a:r>
+          </a:p>
+          <a:p>
+            <a:pPr algn="l">
+              <a:buFont typeface="+mj-lt"/>
+              <a:buAutoNum type="arabicPeriod"/>
+            </a:pPr>
+            <a:r>
+              <a:rPr lang="en-US" sz="1800" b="0" i="0" dirty="0">
+                <a:effectLst/>
+                <a:latin typeface="Söhne"/>
+              </a:rPr>
+              <a:t>By default, PostgreSQL creates a user account called </a:t>
+            </a:r>
+            <a:r>
+              <a:rPr lang="en-US" sz="1800" b="0" i="0" dirty="0" err="1">
+                <a:effectLst/>
+                <a:latin typeface="Söhne"/>
+              </a:rPr>
+              <a:t>postgres</a:t>
+            </a:r>
+            <a:r>
+              <a:rPr lang="en-US" sz="1800" b="0" i="0" dirty="0">
+                <a:effectLst/>
+                <a:latin typeface="Söhne"/>
+              </a:rPr>
+              <a:t>. You can switch to this user by running the command </a:t>
+            </a:r>
+            <a:r>
+              <a:rPr lang="en-US" sz="1800" b="0" i="0" dirty="0" err="1">
+                <a:effectLst/>
+                <a:latin typeface="Söhne"/>
+              </a:rPr>
+              <a:t>su</a:t>
+            </a:r>
+            <a:r>
+              <a:rPr lang="en-US" sz="1800" b="0" i="0" dirty="0">
+                <a:effectLst/>
+                <a:latin typeface="Söhne"/>
+              </a:rPr>
+              <a:t> - </a:t>
+            </a:r>
+            <a:r>
+              <a:rPr lang="en-US" sz="1800" b="0" i="0" dirty="0" err="1">
+                <a:effectLst/>
+                <a:latin typeface="Söhne"/>
+              </a:rPr>
+              <a:t>postgres</a:t>
+            </a:r>
+            <a:r>
+              <a:rPr lang="en-US" sz="1800" b="0" i="0" dirty="0">
+                <a:effectLst/>
+                <a:latin typeface="Söhne"/>
+              </a:rPr>
+              <a:t> on the terminal.</a:t>
+            </a:r>
+          </a:p>
+          <a:p>
+            <a:pPr algn="l">
+              <a:buFont typeface="+mj-lt"/>
+              <a:buAutoNum type="arabicPeriod"/>
+            </a:pPr>
+            <a:r>
+              <a:rPr lang="en-US" sz="1800" b="0" i="0" dirty="0">
+                <a:effectLst/>
+                <a:latin typeface="Söhne"/>
+              </a:rPr>
+              <a:t>Once you're logged in as the </a:t>
+            </a:r>
+            <a:r>
+              <a:rPr lang="en-US" sz="1800" b="0" i="0" dirty="0" err="1">
+                <a:effectLst/>
+                <a:latin typeface="Söhne"/>
+              </a:rPr>
+              <a:t>postgres</a:t>
+            </a:r>
+            <a:r>
+              <a:rPr lang="en-US" sz="1800" b="0" i="0" dirty="0">
+                <a:effectLst/>
+                <a:latin typeface="Söhne"/>
+              </a:rPr>
+              <a:t> user, you can access the PostgreSQL command-line interface by running the command </a:t>
+            </a:r>
+            <a:r>
+              <a:rPr lang="en-US" sz="1800" b="0" i="0" dirty="0" err="1">
+                <a:effectLst/>
+                <a:latin typeface="Söhne"/>
+              </a:rPr>
+              <a:t>psql</a:t>
+            </a:r>
+            <a:r>
+              <a:rPr lang="en-US" sz="1800" b="0" i="0" dirty="0">
+                <a:effectLst/>
+                <a:latin typeface="Söhne"/>
+              </a:rPr>
+              <a:t>. This will open the PostgreSQL shell, where you can run SQL commands to interact with the database.</a:t>
+            </a:r>
+          </a:p>
+          <a:p>
+            <a:pPr algn="l">
+              <a:buFont typeface="+mj-lt"/>
+              <a:buAutoNum type="arabicPeriod"/>
+            </a:pPr>
+            <a:r>
+              <a:rPr lang="en-US" sz="1800" b="0" i="0" dirty="0">
+                <a:effectLst/>
+                <a:latin typeface="Söhne"/>
+              </a:rPr>
+              <a:t>To create a new database, run the command </a:t>
+            </a:r>
+            <a:r>
+              <a:rPr lang="en-US" sz="1800" b="0" i="0" dirty="0" err="1">
+                <a:effectLst/>
+                <a:latin typeface="Söhne"/>
+              </a:rPr>
+              <a:t>createdb</a:t>
+            </a:r>
+            <a:r>
+              <a:rPr lang="en-US" sz="1800" b="0" i="0" dirty="0">
+                <a:effectLst/>
+                <a:latin typeface="Söhne"/>
+              </a:rPr>
+              <a:t> &lt;database-name&gt; in the PostgreSQL shell. Replace &lt;database-name&gt; with the name you want to give to your database.</a:t>
+            </a:r>
+          </a:p>
+          <a:p>
+            <a:pPr algn="l">
+              <a:buFont typeface="+mj-lt"/>
+              <a:buAutoNum type="arabicPeriod"/>
+            </a:pPr>
+            <a:r>
+              <a:rPr lang="en-US" sz="1800" b="0" i="0" dirty="0">
+                <a:effectLst/>
+                <a:latin typeface="Söhne"/>
+              </a:rPr>
+              <a:t>You can connect to the database using the command </a:t>
+            </a:r>
+            <a:r>
+              <a:rPr lang="en-US" sz="1800" b="0" i="0" dirty="0" err="1">
+                <a:effectLst/>
+                <a:latin typeface="Söhne"/>
+              </a:rPr>
+              <a:t>psql</a:t>
+            </a:r>
+            <a:r>
+              <a:rPr lang="en-US" sz="1800" b="0" i="0" dirty="0">
+                <a:effectLst/>
+                <a:latin typeface="Söhne"/>
+              </a:rPr>
+              <a:t> &lt;database-name&gt;. This will open the PostgreSQL shell for the specified database, where you can run SQL commands to create tables, insert data, and perform other database operations.</a:t>
+            </a:r>
+          </a:p>
+          <a:p>
+            <a:pPr marL="0" indent="0">
+              <a:buNone/>
+            </a:pPr>
+            <a:endParaRPr lang="en-IL" sz="1800" dirty="0"/>
+          </a:p>
+        </p:txBody>
+      </p:sp>
+    </p:spTree>
+    <p:extLst>
+      <p:ext uri="{BB962C8B-B14F-4D97-AF65-F5344CB8AC3E}">
+        <p14:creationId xmlns:p14="http://schemas.microsoft.com/office/powerpoint/2010/main" val="3404364247"/>
+      </p:ext>
+    </p:extLst>
+  </p:cSld>
+  <p:clrMapOvr>
+    <a:masterClrMapping/>
+  </p:clrMapOvr>
+</p:sld>
+</file>
+
+<file path=ppt/slides/slide17.xml><?xml version="1.0" encoding="utf-8"?>
+<p:sld xmlns:a="http://schemas.openxmlformats.org/drawingml/2006/main" xmlns:r="http://schemas.openxmlformats.org/officeDocument/2006/relationships" xmlns:p="http://schemas.openxmlformats.org/presentationml/2006/main">
+  <p:cSld>
+    <p:spTree>
+      <p:nvGrpSpPr>
+        <p:cNvPr id="1" name=""/>
+        <p:cNvGrpSpPr/>
+        <p:nvPr/>
+      </p:nvGrpSpPr>
+      <p:grpSpPr>
+        <a:xfrm>
+          <a:off x="0" y="0"/>
+          <a:ext cx="0" cy="0"/>
+          <a:chOff x="0" y="0"/>
+          <a:chExt cx="0" cy="0"/>
+        </a:xfrm>
+      </p:grpSpPr>
+      <p:sp>
+        <p:nvSpPr>
+          <p:cNvPr id="2" name="Title 1">
+            <a:extLst>
+              <a:ext uri="{FF2B5EF4-FFF2-40B4-BE49-F238E27FC236}">
+                <a16:creationId xmlns:a16="http://schemas.microsoft.com/office/drawing/2014/main" id="{7747068A-F79B-AE06-658B-4D7ECEA0D6A8}"/>
+              </a:ext>
+            </a:extLst>
+          </p:cNvPr>
+          <p:cNvSpPr>
+            <a:spLocks noGrp="1"/>
+          </p:cNvSpPr>
+          <p:nvPr>
+            <p:ph type="title"/>
+          </p:nvPr>
+        </p:nvSpPr>
+        <p:spPr/>
+        <p:txBody>
+          <a:bodyPr/>
+          <a:lstStyle/>
+          <a:p>
+            <a:r>
+              <a:rPr lang="en-IL" dirty="0"/>
+              <a:t>SQL OTO</a:t>
+            </a:r>
+          </a:p>
+        </p:txBody>
+      </p:sp>
+      <p:sp>
+        <p:nvSpPr>
+          <p:cNvPr id="3" name="Content Placeholder 2">
+            <a:extLst>
+              <a:ext uri="{FF2B5EF4-FFF2-40B4-BE49-F238E27FC236}">
+                <a16:creationId xmlns:a16="http://schemas.microsoft.com/office/drawing/2014/main" id="{BAC08B16-8910-5841-2F8B-FDEC5D498B8A}"/>
+              </a:ext>
+            </a:extLst>
+          </p:cNvPr>
+          <p:cNvSpPr>
+            <a:spLocks noGrp="1"/>
+          </p:cNvSpPr>
+          <p:nvPr>
+            <p:ph idx="1"/>
+          </p:nvPr>
+        </p:nvSpPr>
+        <p:spPr/>
+        <p:txBody>
+          <a:bodyPr>
+            <a:normAutofit lnSpcReduction="10000"/>
+          </a:bodyPr>
+          <a:lstStyle/>
+          <a:p>
+            <a:r>
+              <a:rPr lang="en-US" dirty="0"/>
+              <a:t>In a relational database, a one-to-one (1:1) relationship refers to a situation where one record in a table is associated with exactly one record in another table, and vice versa. This type of relationship is often used to break down a large table into smaller, more manageable tables that are easier to work with and maintain.</a:t>
+            </a:r>
+          </a:p>
+          <a:p>
+            <a:r>
+              <a:rPr lang="en-US" dirty="0"/>
+              <a:t>For example, consider a database that stores information about employees and their workstations. Each employee can have only one workstation assigned to them, and each workstation can be assigned to only one employee. In this case, we could create two tables: one for employees and one for workstations, and establish a one-to-one relationship between them.</a:t>
+            </a:r>
+          </a:p>
+        </p:txBody>
+      </p:sp>
+    </p:spTree>
+    <p:extLst>
+      <p:ext uri="{BB962C8B-B14F-4D97-AF65-F5344CB8AC3E}">
+        <p14:creationId xmlns:p14="http://schemas.microsoft.com/office/powerpoint/2010/main" val="3741863601"/>
+      </p:ext>
+    </p:extLst>
+  </p:cSld>
+  <p:clrMapOvr>
+    <a:masterClrMapping/>
+  </p:clrMapOvr>
+</p:sld>
+</file>
+
+<file path=ppt/slides/slide18.xml><?xml version="1.0" encoding="utf-8"?>
+<p:sld xmlns:a="http://schemas.openxmlformats.org/drawingml/2006/main" xmlns:r="http://schemas.openxmlformats.org/officeDocument/2006/relationships" xmlns:p="http://schemas.openxmlformats.org/presentationml/2006/main">
+  <p:cSld>
+    <p:bg>
+      <p:bgPr>
+        <a:solidFill>
+          <a:schemeClr val="bg1"/>
+        </a:solidFill>
+        <a:effectLst/>
+      </p:bgPr>
+    </p:bg>
+    <p:spTree>
+      <p:nvGrpSpPr>
+        <p:cNvPr id="1" name=""/>
+        <p:cNvGrpSpPr/>
+        <p:nvPr/>
+      </p:nvGrpSpPr>
+      <p:grpSpPr>
+        <a:xfrm>
+          <a:off x="0" y="0"/>
+          <a:ext cx="0" cy="0"/>
+          <a:chOff x="0" y="0"/>
+          <a:chExt cx="0" cy="0"/>
+        </a:xfrm>
+      </p:grpSpPr>
+      <p:sp useBgFill="1">
+        <p:nvSpPr>
+          <p:cNvPr id="12" name="Rectangle 11">
+            <a:extLst>
+              <a:ext uri="{FF2B5EF4-FFF2-40B4-BE49-F238E27FC236}">
+                <a16:creationId xmlns:a16="http://schemas.microsoft.com/office/drawing/2014/main" id="{D55CA618-78A6-47F6-B865-E9315164FB49}"/>
+              </a:ext>
+              <a:ext uri="{C183D7F6-B498-43B3-948B-1728B52AA6E4}">
+                <adec:decorative xmlns:adec="http://schemas.microsoft.com/office/drawing/2017/decorative" val="1"/>
+              </a:ext>
+            </a:extLst>
+          </p:cNvPr>
+          <p:cNvSpPr>
+            <a:spLocks noGrp="1" noRot="1" noChangeAspect="1" noMove="1" noResize="1" noEditPoints="1" noAdjustHandles="1" noChangeArrowheads="1" noChangeShapeType="1" noTextEdit="1"/>
+          </p:cNvSpPr>
+          <p:nvPr>
+            <p:extLst>
+              <p:ext uri="{386F3935-93C4-4BCD-93E2-E3B085C9AB24}">
+                <p16:designElem xmlns:p16="http://schemas.microsoft.com/office/powerpoint/2015/main" val="1"/>
+              </p:ext>
+            </p:extLst>
+          </p:nvPr>
+        </p:nvSpPr>
+        <p:spPr>
+          <a:xfrm>
+            <a:off x="0" y="0"/>
+            <a:ext cx="12191999" cy="6857365"/>
+          </a:xfrm>
+          <a:prstGeom prst="rect">
+            <a:avLst/>
+          </a:prstGeom>
+          <a:ln>
+            <a:noFill/>
+          </a:ln>
+        </p:spPr>
+        <p:style>
+          <a:lnRef idx="2">
+            <a:schemeClr val="accent1">
+              <a:shade val="50000"/>
+            </a:schemeClr>
+          </a:lnRef>
+          <a:fillRef idx="1">
+            <a:schemeClr val="accent1"/>
+          </a:fillRef>
+          <a:effectRef idx="0">
+            <a:schemeClr val="accent1"/>
+          </a:effectRef>
+          <a:fontRef idx="minor">
+            <a:schemeClr val="lt1"/>
+          </a:fontRef>
+        </p:style>
+        <p:txBody>
+          <a:bodyPr rtlCol="0" anchor="ctr"/>
+          <a:lstStyle/>
+          <a:p>
+            <a:pPr algn="ctr"/>
+            <a:endParaRPr lang="en-US"/>
+          </a:p>
+        </p:txBody>
+      </p:sp>
+      <p:grpSp>
+        <p:nvGrpSpPr>
+          <p:cNvPr id="14" name="Group 13">
+            <a:extLst>
+              <a:ext uri="{FF2B5EF4-FFF2-40B4-BE49-F238E27FC236}">
+                <a16:creationId xmlns:a16="http://schemas.microsoft.com/office/drawing/2014/main" id="{B83D307E-DF68-43F8-97CE-0AAE950A7129}"/>
+              </a:ext>
+              <a:ext uri="{C183D7F6-B498-43B3-948B-1728B52AA6E4}">
+                <adec:decorative xmlns:adec="http://schemas.microsoft.com/office/drawing/2017/decorative" val="1"/>
+              </a:ext>
+            </a:extLst>
+          </p:cNvPr>
+          <p:cNvGrpSpPr>
+            <a:grpSpLocks noGrp="1" noUngrp="1" noRot="1" noChangeAspect="1" noMove="1" noResize="1"/>
+          </p:cNvGrpSpPr>
+          <p:nvPr>
+            <p:extLst>
+              <p:ext uri="{386F3935-93C4-4BCD-93E2-E3B085C9AB24}">
+                <p16:designElem xmlns:p16="http://schemas.microsoft.com/office/powerpoint/2015/main" val="1"/>
+              </p:ext>
+            </p:extLst>
+          </p:nvPr>
+        </p:nvGrpSpPr>
+        <p:grpSpPr>
+          <a:xfrm>
+            <a:off x="2271255" y="-1"/>
+            <a:ext cx="7649490" cy="5728133"/>
+            <a:chOff x="329184" y="1"/>
+            <a:chExt cx="524256" cy="5728133"/>
+          </a:xfrm>
+        </p:grpSpPr>
+        <p:cxnSp>
+          <p:nvCxnSpPr>
+            <p:cNvPr id="15" name="Straight Connector 14">
+              <a:extLst>
+                <a:ext uri="{FF2B5EF4-FFF2-40B4-BE49-F238E27FC236}">
+                  <a16:creationId xmlns:a16="http://schemas.microsoft.com/office/drawing/2014/main" id="{5546E3D2-37BF-4528-9851-2B2F628234A2}"/>
+                </a:ext>
+                <a:ext uri="{C183D7F6-B498-43B3-948B-1728B52AA6E4}">
+                  <adec:decorative xmlns:adec="http://schemas.microsoft.com/office/drawing/2017/decorative" val="1"/>
+                </a:ext>
+              </a:extLst>
+            </p:cNvPr>
+            <p:cNvCxnSpPr>
+              <a:cxnSpLocks/>
+            </p:cNvCxnSpPr>
+            <p:nvPr>
+              <p:extLst>
+                <p:ext uri="{386F3935-93C4-4BCD-93E2-E3B085C9AB24}">
+                  <p16:designElem xmlns:p16="http://schemas.microsoft.com/office/powerpoint/2015/main" val="1"/>
+                </p:ext>
+              </p:extLst>
+            </p:nvPr>
+          </p:nvCxnSpPr>
+          <p:spPr>
+            <a:xfrm flipH="1">
+              <a:off x="329184" y="5728134"/>
+              <a:ext cx="523824" cy="0"/>
+            </a:xfrm>
+            <a:prstGeom prst="line">
+              <a:avLst/>
+            </a:prstGeom>
+            <a:ln w="152400">
+              <a:solidFill>
+                <a:schemeClr val="accent4"/>
+              </a:solidFill>
+            </a:ln>
+          </p:spPr>
+          <p:style>
+            <a:lnRef idx="1">
+              <a:schemeClr val="accent1"/>
+            </a:lnRef>
+            <a:fillRef idx="0">
+              <a:schemeClr val="accent1"/>
+            </a:fillRef>
+            <a:effectRef idx="0">
+              <a:schemeClr val="accent1"/>
+            </a:effectRef>
+            <a:fontRef idx="minor">
+              <a:schemeClr val="tx1"/>
+            </a:fontRef>
+          </p:style>
+        </p:cxnSp>
+        <p:sp>
+          <p:nvSpPr>
+            <p:cNvPr id="16" name="Rectangle 15">
+              <a:extLst>
+                <a:ext uri="{FF2B5EF4-FFF2-40B4-BE49-F238E27FC236}">
+                  <a16:creationId xmlns:a16="http://schemas.microsoft.com/office/drawing/2014/main" id="{752A0C69-DC4E-4FC0-843C-BAA27B3A5621}"/>
+                </a:ext>
+                <a:ext uri="{C183D7F6-B498-43B3-948B-1728B52AA6E4}">
+                  <adec:decorative xmlns:adec="http://schemas.microsoft.com/office/drawing/2017/decorative" val="1"/>
+                </a:ext>
+              </a:extLst>
+            </p:cNvPr>
+            <p:cNvSpPr/>
+            <p:nvPr>
+              <p:extLst>
+                <p:ext uri="{386F3935-93C4-4BCD-93E2-E3B085C9AB24}">
+                  <p16:designElem xmlns:p16="http://schemas.microsoft.com/office/powerpoint/2015/main" val="1"/>
+                </p:ext>
+              </p:extLst>
+            </p:nvPr>
+          </p:nvSpPr>
+          <p:spPr>
+            <a:xfrm>
+              <a:off x="329184" y="1"/>
+              <a:ext cx="524256" cy="5532119"/>
+            </a:xfrm>
+            <a:prstGeom prst="rect">
+              <a:avLst/>
+            </a:prstGeom>
+            <a:solidFill>
+              <a:schemeClr val="accent4"/>
+            </a:solidFill>
+            <a:ln>
+              <a:noFill/>
+            </a:ln>
+          </p:spPr>
+          <p:style>
+            <a:lnRef idx="2">
+              <a:schemeClr val="accent1">
+                <a:shade val="50000"/>
+              </a:schemeClr>
+            </a:lnRef>
+            <a:fillRef idx="1">
+              <a:schemeClr val="accent1"/>
+            </a:fillRef>
+            <a:effectRef idx="0">
+              <a:schemeClr val="accent1"/>
+            </a:effectRef>
+            <a:fontRef idx="minor">
+              <a:schemeClr val="lt1"/>
+            </a:fontRef>
+          </p:style>
+          <p:txBody>
+            <a:bodyPr rtlCol="0" anchor="ctr"/>
+            <a:lstStyle/>
+            <a:p>
+              <a:pPr algn="ctr"/>
+              <a:endParaRPr lang="en-US" dirty="0"/>
+            </a:p>
+          </p:txBody>
+        </p:sp>
+      </p:grpSp>
+      <p:sp>
+        <p:nvSpPr>
+          <p:cNvPr id="18" name="Rectangle 17">
+            <a:extLst>
+              <a:ext uri="{FF2B5EF4-FFF2-40B4-BE49-F238E27FC236}">
+                <a16:creationId xmlns:a16="http://schemas.microsoft.com/office/drawing/2014/main" id="{8ED94938-268E-4C0A-A08A-B3980C78BAEB}"/>
+              </a:ext>
+              <a:ext uri="{C183D7F6-B498-43B3-948B-1728B52AA6E4}">
+                <adec:decorative xmlns:adec="http://schemas.microsoft.com/office/drawing/2017/decorative" val="1"/>
+              </a:ext>
+            </a:extLst>
+          </p:cNvPr>
+          <p:cNvSpPr>
+            <a:spLocks noGrp="1" noRot="1" noChangeAspect="1" noMove="1" noResize="1" noEditPoints="1" noAdjustHandles="1" noChangeArrowheads="1" noChangeShapeType="1" noTextEdit="1"/>
+          </p:cNvSpPr>
+          <p:nvPr>
+            <p:extLst>
+              <p:ext uri="{386F3935-93C4-4BCD-93E2-E3B085C9AB24}">
+                <p16:designElem xmlns:p16="http://schemas.microsoft.com/office/powerpoint/2015/main" val="1"/>
+              </p:ext>
+            </p:extLst>
+          </p:nvPr>
+        </p:nvSpPr>
+        <p:spPr>
+          <a:xfrm>
+            <a:off x="596464" y="318045"/>
+            <a:ext cx="10999072" cy="5325139"/>
+          </a:xfrm>
+          <a:prstGeom prst="rect">
+            <a:avLst/>
+          </a:prstGeom>
+          <a:solidFill>
+            <a:schemeClr val="bg1"/>
+          </a:solidFill>
+          <a:ln>
+            <a:noFill/>
+          </a:ln>
+          <a:effectLst>
+            <a:outerShdw blurRad="139700" dist="127000" dir="5400000" algn="t" rotWithShape="0">
+              <a:prstClr val="black">
+                <a:alpha val="15000"/>
+              </a:prstClr>
+            </a:outerShdw>
+          </a:effectLst>
+        </p:spPr>
+        <p:style>
+          <a:lnRef idx="2">
+            <a:schemeClr val="accent1">
+              <a:shade val="50000"/>
+            </a:schemeClr>
+          </a:lnRef>
+          <a:fillRef idx="1">
+            <a:schemeClr val="accent1"/>
+          </a:fillRef>
+          <a:effectRef idx="0">
+            <a:schemeClr val="accent1"/>
+          </a:effectRef>
+          <a:fontRef idx="minor">
+            <a:schemeClr val="lt1"/>
+          </a:fontRef>
+        </p:style>
+        <p:txBody>
+          <a:bodyPr rtlCol="0" anchor="ctr"/>
+          <a:lstStyle/>
+          <a:p>
+            <a:pPr algn="ctr"/>
+            <a:endParaRPr lang="en-US"/>
+          </a:p>
+        </p:txBody>
+      </p:sp>
+      <p:sp>
+        <p:nvSpPr>
+          <p:cNvPr id="2" name="Title 1">
+            <a:extLst>
+              <a:ext uri="{FF2B5EF4-FFF2-40B4-BE49-F238E27FC236}">
+                <a16:creationId xmlns:a16="http://schemas.microsoft.com/office/drawing/2014/main" id="{BFB2CE80-D097-52F5-34A2-CD3EBCEA3611}"/>
+              </a:ext>
+            </a:extLst>
+          </p:cNvPr>
+          <p:cNvSpPr>
+            <a:spLocks noGrp="1"/>
+          </p:cNvSpPr>
+          <p:nvPr>
+            <p:ph type="title"/>
+          </p:nvPr>
+        </p:nvSpPr>
+        <p:spPr>
+          <a:xfrm>
+            <a:off x="1060232" y="3941205"/>
+            <a:ext cx="10071536" cy="929750"/>
+          </a:xfrm>
+        </p:spPr>
+        <p:txBody>
+          <a:bodyPr vert="horz" lIns="91440" tIns="45720" rIns="91440" bIns="45720" rtlCol="0" anchor="b">
+            <a:normAutofit/>
+          </a:bodyPr>
+          <a:lstStyle/>
+          <a:p>
+            <a:pPr algn="ctr"/>
+            <a:r>
+              <a:rPr lang="en-US" sz="5200" dirty="0"/>
+              <a:t>One to one example</a:t>
+            </a:r>
+          </a:p>
+        </p:txBody>
+      </p:sp>
+      <p:pic>
+        <p:nvPicPr>
+          <p:cNvPr id="5" name="Content Placeholder 4" descr="A screenshot of a computer screen&#10;&#10;Description automatically generated with low confidence">
+            <a:extLst>
+              <a:ext uri="{FF2B5EF4-FFF2-40B4-BE49-F238E27FC236}">
+                <a16:creationId xmlns:a16="http://schemas.microsoft.com/office/drawing/2014/main" id="{F2312053-F4F6-959A-06F6-9DFCBBC39221}"/>
+              </a:ext>
+            </a:extLst>
+          </p:cNvPr>
+          <p:cNvPicPr>
+            <a:picLocks noGrp="1" noChangeAspect="1"/>
+          </p:cNvPicPr>
+          <p:nvPr>
+            <p:ph idx="1"/>
+          </p:nvPr>
+        </p:nvPicPr>
+        <p:blipFill>
+          <a:blip r:embed="rId2"/>
+          <a:stretch>
+            <a:fillRect/>
+          </a:stretch>
+        </p:blipFill>
+        <p:spPr>
+          <a:xfrm>
+            <a:off x="897717" y="1106203"/>
+            <a:ext cx="5069590" cy="2129227"/>
+          </a:xfrm>
+          <a:prstGeom prst="rect">
+            <a:avLst/>
+          </a:prstGeom>
+        </p:spPr>
+      </p:pic>
+      <p:pic>
+        <p:nvPicPr>
+          <p:cNvPr id="7" name="Picture 6" descr="A picture containing text, screenshot, font, number&#10;&#10;Description automatically generated">
+            <a:extLst>
+              <a:ext uri="{FF2B5EF4-FFF2-40B4-BE49-F238E27FC236}">
+                <a16:creationId xmlns:a16="http://schemas.microsoft.com/office/drawing/2014/main" id="{A44176E1-7E33-D1DF-4FBC-9C86A7E0DF02}"/>
+              </a:ext>
+            </a:extLst>
+          </p:cNvPr>
+          <p:cNvPicPr>
+            <a:picLocks noChangeAspect="1"/>
+          </p:cNvPicPr>
+          <p:nvPr/>
+        </p:nvPicPr>
+        <p:blipFill>
+          <a:blip r:embed="rId3"/>
+          <a:stretch>
+            <a:fillRect/>
+          </a:stretch>
+        </p:blipFill>
+        <p:spPr>
+          <a:xfrm>
+            <a:off x="6228507" y="923370"/>
+            <a:ext cx="5065776" cy="2494893"/>
+          </a:xfrm>
+          <a:prstGeom prst="rect">
+            <a:avLst/>
+          </a:prstGeom>
+        </p:spPr>
+      </p:pic>
+    </p:spTree>
+    <p:extLst>
+      <p:ext uri="{BB962C8B-B14F-4D97-AF65-F5344CB8AC3E}">
+        <p14:creationId xmlns:p14="http://schemas.microsoft.com/office/powerpoint/2010/main" val="3607988591"/>
+      </p:ext>
+    </p:extLst>
+  </p:cSld>
+  <p:clrMapOvr>
+    <a:masterClrMapping/>
+  </p:clrMapOvr>
+</p:sld>
+</file>
+
+<file path=ppt/slides/slide19.xml><?xml version="1.0" encoding="utf-8"?>
+<p:sld xmlns:a="http://schemas.openxmlformats.org/drawingml/2006/main" xmlns:r="http://schemas.openxmlformats.org/officeDocument/2006/relationships" xmlns:p="http://schemas.openxmlformats.org/presentationml/2006/main">
+  <p:cSld>
+    <p:spTree>
+      <p:nvGrpSpPr>
+        <p:cNvPr id="1" name=""/>
+        <p:cNvGrpSpPr/>
+        <p:nvPr/>
+      </p:nvGrpSpPr>
+      <p:grpSpPr>
+        <a:xfrm>
+          <a:off x="0" y="0"/>
+          <a:ext cx="0" cy="0"/>
+          <a:chOff x="0" y="0"/>
+          <a:chExt cx="0" cy="0"/>
+        </a:xfrm>
+      </p:grpSpPr>
+      <p:sp>
+        <p:nvSpPr>
+          <p:cNvPr id="2" name="Title 1">
+            <a:extLst>
+              <a:ext uri="{FF2B5EF4-FFF2-40B4-BE49-F238E27FC236}">
+                <a16:creationId xmlns:a16="http://schemas.microsoft.com/office/drawing/2014/main" id="{389D3BD2-C80A-7C0D-A6E6-7AFBD1EE2EC3}"/>
+              </a:ext>
+            </a:extLst>
+          </p:cNvPr>
+          <p:cNvSpPr>
+            <a:spLocks noGrp="1"/>
+          </p:cNvSpPr>
+          <p:nvPr>
+            <p:ph type="title"/>
+          </p:nvPr>
+        </p:nvSpPr>
+        <p:spPr/>
+        <p:txBody>
+          <a:bodyPr/>
+          <a:lstStyle/>
+          <a:p>
+            <a:r>
+              <a:rPr lang="en-US" dirty="0"/>
+              <a:t>O</a:t>
+            </a:r>
+            <a:r>
+              <a:rPr lang="en-IL" dirty="0"/>
+              <a:t>ne to many</a:t>
+            </a:r>
+          </a:p>
+        </p:txBody>
+      </p:sp>
+      <p:sp>
+        <p:nvSpPr>
+          <p:cNvPr id="3" name="Content Placeholder 2">
+            <a:extLst>
+              <a:ext uri="{FF2B5EF4-FFF2-40B4-BE49-F238E27FC236}">
+                <a16:creationId xmlns:a16="http://schemas.microsoft.com/office/drawing/2014/main" id="{1995ABE4-AADB-D980-22AF-25D3DDE0D42C}"/>
+              </a:ext>
+            </a:extLst>
+          </p:cNvPr>
+          <p:cNvSpPr>
+            <a:spLocks noGrp="1"/>
+          </p:cNvSpPr>
+          <p:nvPr>
+            <p:ph idx="1"/>
+          </p:nvPr>
+        </p:nvSpPr>
+        <p:spPr/>
+        <p:txBody>
+          <a:bodyPr>
+            <a:normAutofit lnSpcReduction="10000"/>
+          </a:bodyPr>
+          <a:lstStyle/>
+          <a:p>
+            <a:r>
+              <a:rPr lang="en-US" dirty="0"/>
+              <a:t>In a relational database, a one-to-many (1:N) relationship refers to a situation where one record in a table is associated with one or more records in another table, but each record in the second table is associated with only one record in the first table. This type of relationship is one of the most common types of relationships in a database, and is used to break down large tables into smaller, more manageable tables.</a:t>
+            </a:r>
+          </a:p>
+          <a:p>
+            <a:r>
+              <a:rPr lang="en-US" dirty="0"/>
+              <a:t>For example, consider a database that stores information about customers and their orders. Each customer can have multiple orders, but each order is associated with only one customer. In this case, we could create two tables: one for customers and one for orders, and establish a one-to-many relationship between them.</a:t>
+            </a:r>
+          </a:p>
+        </p:txBody>
+      </p:sp>
+    </p:spTree>
+    <p:extLst>
+      <p:ext uri="{BB962C8B-B14F-4D97-AF65-F5344CB8AC3E}">
+        <p14:creationId xmlns:p14="http://schemas.microsoft.com/office/powerpoint/2010/main" val="962586865"/>
+      </p:ext>
+    </p:extLst>
+  </p:cSld>
+  <p:clrMapOvr>
+    <a:masterClrMapping/>
+  </p:clrMapOvr>
+</p:sld>
+</file>
+
 <file path=ppt/slides/slide2.xml><?xml version="1.0" encoding="utf-8"?>
 <p:sld xmlns:a="http://schemas.openxmlformats.org/drawingml/2006/main" xmlns:r="http://schemas.openxmlformats.org/officeDocument/2006/relationships" xmlns:p="http://schemas.openxmlformats.org/presentationml/2006/main">
   <p:cSld>
@@ -3433,7 +5293,7 @@
           <p:cNvPr id="2" name="Title 1">
             <a:extLst>
               <a:ext uri="{FF2B5EF4-FFF2-40B4-BE49-F238E27FC236}">
-                <a16:creationId xmlns:a16="http://schemas.microsoft.com/office/drawing/2014/main" id="{4F3B4A9B-D7F0-9D8F-ED16-B1DA143B63BE}"/>
+                <a16:creationId xmlns:a16="http://schemas.microsoft.com/office/drawing/2014/main" id="{05177CD8-1577-1B43-6A99-F30DDB7D00C4}"/>
               </a:ext>
             </a:extLst>
           </p:cNvPr>
@@ -3444,16 +5304,26 @@
             <p:ph type="title"/>
           </p:nvPr>
         </p:nvSpPr>
-        <p:spPr/>
-        <p:txBody>
-          <a:bodyPr/>
-          <a:lstStyle/>
-          <a:p>
-            <a:r>
-              <a:rPr lang="en-US" dirty="0"/>
-              <a:t>Narrowing</a:t>
-            </a:r>
-            <a:endParaRPr lang="en-IL" dirty="0"/>
+        <p:spPr>
+          <a:xfrm>
+            <a:off x="838200" y="365125"/>
+            <a:ext cx="10007009" cy="857619"/>
+          </a:xfrm>
+        </p:spPr>
+        <p:txBody>
+          <a:bodyPr>
+            <a:normAutofit/>
+          </a:bodyPr>
+          <a:lstStyle/>
+          <a:p>
+            <a:r>
+              <a:rPr lang="en-US" sz="3600" dirty="0"/>
+              <a:t>V</a:t>
+            </a:r>
+            <a:r>
+              <a:rPr lang="en-IL" sz="3600" dirty="0"/>
+              <a:t>ite new project files and folder</a:t>
+            </a:r>
           </a:p>
         </p:txBody>
       </p:sp>
@@ -3462,7 +5332,7 @@
           <p:cNvPr id="3" name="Content Placeholder 2">
             <a:extLst>
               <a:ext uri="{FF2B5EF4-FFF2-40B4-BE49-F238E27FC236}">
-                <a16:creationId xmlns:a16="http://schemas.microsoft.com/office/drawing/2014/main" id="{E849330D-8930-A2E4-644F-5197A7592CBB}"/>
+                <a16:creationId xmlns:a16="http://schemas.microsoft.com/office/drawing/2014/main" id="{85368711-2939-027B-EE1D-0F7E948016DF}"/>
               </a:ext>
             </a:extLst>
           </p:cNvPr>
@@ -3473,44 +5343,1372 @@
             <p:ph idx="1"/>
           </p:nvPr>
         </p:nvSpPr>
-        <p:spPr/>
-        <p:txBody>
-          <a:bodyPr/>
-          <a:lstStyle/>
-          <a:p>
-            <a:r>
-              <a:rPr lang="en-US" dirty="0"/>
-              <a:t>In TypeScript, narrowing is the process of refining the type of a variable or expression based on additional information that is available to the compiler at a certain point in the program. This can be done using various constructs such as type guards, type assertions, and control flow analysis.</a:t>
-            </a:r>
-          </a:p>
-          <a:p>
-            <a:r>
-              <a:rPr lang="en-US" dirty="0"/>
-              <a:t>Type guards are functions or expressions that return a </a:t>
-            </a:r>
-            <a:r>
-              <a:rPr lang="en-US" dirty="0" err="1"/>
-              <a:t>boolean</a:t>
-            </a:r>
-            <a:r>
-              <a:rPr lang="en-US" dirty="0"/>
-              <a:t> value, which is used by the TypeScript compiler to narrow the type of a variable. For example, the </a:t>
-            </a:r>
-            <a:r>
-              <a:rPr lang="en-US" dirty="0" err="1"/>
-              <a:t>typeof</a:t>
-            </a:r>
-            <a:r>
-              <a:rPr lang="en-US" dirty="0"/>
-              <a:t> operator can be used as a type guard to narrow the type of a variable based on its type at runtime</a:t>
-            </a:r>
+        <p:spPr>
+          <a:xfrm>
+            <a:off x="838200" y="1148316"/>
+            <a:ext cx="10515600" cy="5028647"/>
+          </a:xfrm>
+        </p:spPr>
+        <p:txBody>
+          <a:bodyPr>
+            <a:normAutofit fontScale="92500" lnSpcReduction="20000"/>
+          </a:bodyPr>
+          <a:lstStyle/>
+          <a:p>
+            <a:r>
+              <a:rPr lang="en-US" sz="1600" dirty="0" err="1"/>
+              <a:t>node_modules</a:t>
+            </a:r>
+            <a:r>
+              <a:rPr lang="en-US" sz="1600" dirty="0"/>
+              <a:t>/: This folder contains all the third-party dependencies that your project requires.</a:t>
+            </a:r>
+          </a:p>
+          <a:p>
+            <a:r>
+              <a:rPr lang="en-US" sz="1600" dirty="0"/>
+              <a:t>public/: This folder contains any static assets (such as images or fonts) and the HTML file that </a:t>
+            </a:r>
+            <a:r>
+              <a:rPr lang="en-US" sz="1600" dirty="0" err="1"/>
+              <a:t>Vite</a:t>
+            </a:r>
+            <a:r>
+              <a:rPr lang="en-US" sz="1600" dirty="0"/>
+              <a:t> uses as the entry point for your application.</a:t>
+            </a:r>
+          </a:p>
+          <a:p>
+            <a:r>
+              <a:rPr lang="en-US" sz="1600" dirty="0" err="1"/>
+              <a:t>favicon.ico</a:t>
+            </a:r>
+            <a:r>
+              <a:rPr lang="en-US" sz="1600" dirty="0"/>
+              <a:t>: This is the favicon for your application.</a:t>
+            </a:r>
+          </a:p>
+          <a:p>
+            <a:r>
+              <a:rPr lang="en-US" sz="1600" dirty="0" err="1"/>
+              <a:t>index.html</a:t>
+            </a:r>
+            <a:r>
+              <a:rPr lang="en-US" sz="1600" dirty="0"/>
+              <a:t>: This is the HTML file that serves as the entry point for your application. You can modify this file to add any additional scripts, stylesheets, or content that your application requires.</a:t>
+            </a:r>
+          </a:p>
+          <a:p>
+            <a:r>
+              <a:rPr lang="en-US" sz="1600" dirty="0" err="1"/>
+              <a:t>src</a:t>
+            </a:r>
+            <a:r>
+              <a:rPr lang="en-US" sz="1600" dirty="0"/>
+              <a:t>/: This folder contains all of your source code.</a:t>
+            </a:r>
+          </a:p>
+          <a:p>
+            <a:r>
+              <a:rPr lang="en-US" sz="1600" dirty="0" err="1"/>
+              <a:t>main.ts</a:t>
+            </a:r>
+            <a:r>
+              <a:rPr lang="en-US" sz="1600" dirty="0"/>
+              <a:t>: This is the main entry point for your application. This file is responsible for rendering your root component and mounting it to the DOM.</a:t>
+            </a:r>
+          </a:p>
+          <a:p>
+            <a:r>
+              <a:rPr lang="en-US" sz="1600" dirty="0" err="1"/>
+              <a:t>App.ts</a:t>
+            </a:r>
+            <a:r>
+              <a:rPr lang="en-US" sz="1600" dirty="0"/>
+              <a:t>: This is the root component of your application. You can modify this file to define the structure and behavior of your application.</a:t>
+            </a:r>
+          </a:p>
+          <a:p>
+            <a:r>
+              <a:rPr lang="en-US" sz="1600" dirty="0"/>
+              <a:t>components/: This folder contains any additional components that your application requires.</a:t>
+            </a:r>
+          </a:p>
+          <a:p>
+            <a:r>
+              <a:rPr lang="en-US" sz="1600" dirty="0" err="1"/>
+              <a:t>MyComponent.ts</a:t>
+            </a:r>
+            <a:r>
+              <a:rPr lang="en-US" sz="1600" dirty="0"/>
+              <a:t>: This is an example component that you can modify or delete. You can create additional components by adding new TypeScript files to this folder.</a:t>
+            </a:r>
+          </a:p>
+          <a:p>
+            <a:r>
+              <a:rPr lang="en-US" sz="1600" dirty="0" err="1"/>
+              <a:t>package.json</a:t>
+            </a:r>
+            <a:r>
+              <a:rPr lang="en-US" sz="1600" dirty="0"/>
+              <a:t>: This file contains information about your project, including its dependencies, scripts, and other metadata.</a:t>
+            </a:r>
+          </a:p>
+          <a:p>
+            <a:r>
+              <a:rPr lang="en-US" sz="1600" dirty="0" err="1"/>
+              <a:t>tsconfig.json</a:t>
+            </a:r>
+            <a:r>
+              <a:rPr lang="en-US" sz="1600" dirty="0"/>
+              <a:t>: This file contains TypeScript-specific configuration options for your project.</a:t>
+            </a:r>
+          </a:p>
+          <a:p>
+            <a:r>
+              <a:rPr lang="en-US" sz="1600" dirty="0" err="1"/>
+              <a:t>vite.config.ts</a:t>
+            </a:r>
+            <a:r>
+              <a:rPr lang="en-US" sz="1600" dirty="0"/>
+              <a:t>: This file contains </a:t>
+            </a:r>
+            <a:r>
+              <a:rPr lang="en-US" sz="1600" dirty="0" err="1"/>
+              <a:t>Vite</a:t>
+            </a:r>
+            <a:r>
+              <a:rPr lang="en-US" sz="1600" dirty="0"/>
+              <a:t>-specific configuration options for your project.</a:t>
+            </a:r>
+          </a:p>
+          <a:p>
+            <a:r>
+              <a:rPr lang="en-US" sz="1600" dirty="0"/>
+              <a:t>By default, </a:t>
+            </a:r>
+            <a:r>
+              <a:rPr lang="en-US" sz="1600" dirty="0" err="1"/>
+              <a:t>Vite</a:t>
+            </a:r>
+            <a:r>
+              <a:rPr lang="en-US" sz="1600" dirty="0"/>
+              <a:t> is configured to use TypeScript as the primary language for your project. This means that you can write your code in TypeScript and </a:t>
+            </a:r>
+            <a:r>
+              <a:rPr lang="en-US" sz="1600" dirty="0" err="1"/>
+              <a:t>Vite</a:t>
+            </a:r>
+            <a:r>
+              <a:rPr lang="en-US" sz="1600" dirty="0"/>
+              <a:t> will automatically compile it to JavaScript when you run the development server or build your project for production.</a:t>
+            </a:r>
+            <a:br>
+              <a:rPr lang="en-US" sz="1600" dirty="0"/>
+            </a:br>
+            <a:endParaRPr lang="en-US" sz="1600" dirty="0"/>
+          </a:p>
+          <a:p>
+            <a:endParaRPr lang="en-IL" sz="1600" dirty="0"/>
           </a:p>
         </p:txBody>
       </p:sp>
     </p:spTree>
     <p:extLst>
       <p:ext uri="{BB962C8B-B14F-4D97-AF65-F5344CB8AC3E}">
-        <p14:creationId xmlns:p14="http://schemas.microsoft.com/office/powerpoint/2010/main" val="1986193727"/>
+        <p14:creationId xmlns:p14="http://schemas.microsoft.com/office/powerpoint/2010/main" val="1567562007"/>
+      </p:ext>
+    </p:extLst>
+  </p:cSld>
+  <p:clrMapOvr>
+    <a:masterClrMapping/>
+  </p:clrMapOvr>
+</p:sld>
+</file>
+
+<file path=ppt/slides/slide20.xml><?xml version="1.0" encoding="utf-8"?>
+<p:sld xmlns:a="http://schemas.openxmlformats.org/drawingml/2006/main" xmlns:r="http://schemas.openxmlformats.org/officeDocument/2006/relationships" xmlns:p="http://schemas.openxmlformats.org/presentationml/2006/main">
+  <p:cSld>
+    <p:bg>
+      <p:bgPr>
+        <a:solidFill>
+          <a:schemeClr val="bg1"/>
+        </a:solidFill>
+        <a:effectLst/>
+      </p:bgPr>
+    </p:bg>
+    <p:spTree>
+      <p:nvGrpSpPr>
+        <p:cNvPr id="1" name=""/>
+        <p:cNvGrpSpPr/>
+        <p:nvPr/>
+      </p:nvGrpSpPr>
+      <p:grpSpPr>
+        <a:xfrm>
+          <a:off x="0" y="0"/>
+          <a:ext cx="0" cy="0"/>
+          <a:chOff x="0" y="0"/>
+          <a:chExt cx="0" cy="0"/>
+        </a:xfrm>
+      </p:grpSpPr>
+      <p:sp useBgFill="1">
+        <p:nvSpPr>
+          <p:cNvPr id="12" name="Rectangle 11">
+            <a:extLst>
+              <a:ext uri="{FF2B5EF4-FFF2-40B4-BE49-F238E27FC236}">
+                <a16:creationId xmlns:a16="http://schemas.microsoft.com/office/drawing/2014/main" id="{D55CA618-78A6-47F6-B865-E9315164FB49}"/>
+              </a:ext>
+              <a:ext uri="{C183D7F6-B498-43B3-948B-1728B52AA6E4}">
+                <adec:decorative xmlns:adec="http://schemas.microsoft.com/office/drawing/2017/decorative" val="1"/>
+              </a:ext>
+            </a:extLst>
+          </p:cNvPr>
+          <p:cNvSpPr>
+            <a:spLocks noGrp="1" noRot="1" noChangeAspect="1" noMove="1" noResize="1" noEditPoints="1" noAdjustHandles="1" noChangeArrowheads="1" noChangeShapeType="1" noTextEdit="1"/>
+          </p:cNvSpPr>
+          <p:nvPr>
+            <p:extLst>
+              <p:ext uri="{386F3935-93C4-4BCD-93E2-E3B085C9AB24}">
+                <p16:designElem xmlns:p16="http://schemas.microsoft.com/office/powerpoint/2015/main" val="1"/>
+              </p:ext>
+            </p:extLst>
+          </p:nvPr>
+        </p:nvSpPr>
+        <p:spPr>
+          <a:xfrm>
+            <a:off x="0" y="0"/>
+            <a:ext cx="12191999" cy="6857365"/>
+          </a:xfrm>
+          <a:prstGeom prst="rect">
+            <a:avLst/>
+          </a:prstGeom>
+          <a:ln>
+            <a:noFill/>
+          </a:ln>
+        </p:spPr>
+        <p:style>
+          <a:lnRef idx="2">
+            <a:schemeClr val="accent1">
+              <a:shade val="50000"/>
+            </a:schemeClr>
+          </a:lnRef>
+          <a:fillRef idx="1">
+            <a:schemeClr val="accent1"/>
+          </a:fillRef>
+          <a:effectRef idx="0">
+            <a:schemeClr val="accent1"/>
+          </a:effectRef>
+          <a:fontRef idx="minor">
+            <a:schemeClr val="lt1"/>
+          </a:fontRef>
+        </p:style>
+        <p:txBody>
+          <a:bodyPr rtlCol="0" anchor="ctr"/>
+          <a:lstStyle/>
+          <a:p>
+            <a:pPr algn="ctr"/>
+            <a:endParaRPr lang="en-US"/>
+          </a:p>
+        </p:txBody>
+      </p:sp>
+      <p:grpSp>
+        <p:nvGrpSpPr>
+          <p:cNvPr id="14" name="Group 13">
+            <a:extLst>
+              <a:ext uri="{FF2B5EF4-FFF2-40B4-BE49-F238E27FC236}">
+                <a16:creationId xmlns:a16="http://schemas.microsoft.com/office/drawing/2014/main" id="{B83D307E-DF68-43F8-97CE-0AAE950A7129}"/>
+              </a:ext>
+              <a:ext uri="{C183D7F6-B498-43B3-948B-1728B52AA6E4}">
+                <adec:decorative xmlns:adec="http://schemas.microsoft.com/office/drawing/2017/decorative" val="1"/>
+              </a:ext>
+            </a:extLst>
+          </p:cNvPr>
+          <p:cNvGrpSpPr>
+            <a:grpSpLocks noGrp="1" noUngrp="1" noRot="1" noChangeAspect="1" noMove="1" noResize="1"/>
+          </p:cNvGrpSpPr>
+          <p:nvPr>
+            <p:extLst>
+              <p:ext uri="{386F3935-93C4-4BCD-93E2-E3B085C9AB24}">
+                <p16:designElem xmlns:p16="http://schemas.microsoft.com/office/powerpoint/2015/main" val="1"/>
+              </p:ext>
+            </p:extLst>
+          </p:nvPr>
+        </p:nvGrpSpPr>
+        <p:grpSpPr>
+          <a:xfrm>
+            <a:off x="2271255" y="-1"/>
+            <a:ext cx="7649490" cy="5728133"/>
+            <a:chOff x="329184" y="1"/>
+            <a:chExt cx="524256" cy="5728133"/>
+          </a:xfrm>
+        </p:grpSpPr>
+        <p:cxnSp>
+          <p:nvCxnSpPr>
+            <p:cNvPr id="15" name="Straight Connector 14">
+              <a:extLst>
+                <a:ext uri="{FF2B5EF4-FFF2-40B4-BE49-F238E27FC236}">
+                  <a16:creationId xmlns:a16="http://schemas.microsoft.com/office/drawing/2014/main" id="{5546E3D2-37BF-4528-9851-2B2F628234A2}"/>
+                </a:ext>
+                <a:ext uri="{C183D7F6-B498-43B3-948B-1728B52AA6E4}">
+                  <adec:decorative xmlns:adec="http://schemas.microsoft.com/office/drawing/2017/decorative" val="1"/>
+                </a:ext>
+              </a:extLst>
+            </p:cNvPr>
+            <p:cNvCxnSpPr>
+              <a:cxnSpLocks/>
+            </p:cNvCxnSpPr>
+            <p:nvPr>
+              <p:extLst>
+                <p:ext uri="{386F3935-93C4-4BCD-93E2-E3B085C9AB24}">
+                  <p16:designElem xmlns:p16="http://schemas.microsoft.com/office/powerpoint/2015/main" val="1"/>
+                </p:ext>
+              </p:extLst>
+            </p:nvPr>
+          </p:nvCxnSpPr>
+          <p:spPr>
+            <a:xfrm flipH="1">
+              <a:off x="329184" y="5728134"/>
+              <a:ext cx="523824" cy="0"/>
+            </a:xfrm>
+            <a:prstGeom prst="line">
+              <a:avLst/>
+            </a:prstGeom>
+            <a:ln w="152400">
+              <a:solidFill>
+                <a:schemeClr val="accent4"/>
+              </a:solidFill>
+            </a:ln>
+          </p:spPr>
+          <p:style>
+            <a:lnRef idx="1">
+              <a:schemeClr val="accent1"/>
+            </a:lnRef>
+            <a:fillRef idx="0">
+              <a:schemeClr val="accent1"/>
+            </a:fillRef>
+            <a:effectRef idx="0">
+              <a:schemeClr val="accent1"/>
+            </a:effectRef>
+            <a:fontRef idx="minor">
+              <a:schemeClr val="tx1"/>
+            </a:fontRef>
+          </p:style>
+        </p:cxnSp>
+        <p:sp>
+          <p:nvSpPr>
+            <p:cNvPr id="16" name="Rectangle 15">
+              <a:extLst>
+                <a:ext uri="{FF2B5EF4-FFF2-40B4-BE49-F238E27FC236}">
+                  <a16:creationId xmlns:a16="http://schemas.microsoft.com/office/drawing/2014/main" id="{752A0C69-DC4E-4FC0-843C-BAA27B3A5621}"/>
+                </a:ext>
+                <a:ext uri="{C183D7F6-B498-43B3-948B-1728B52AA6E4}">
+                  <adec:decorative xmlns:adec="http://schemas.microsoft.com/office/drawing/2017/decorative" val="1"/>
+                </a:ext>
+              </a:extLst>
+            </p:cNvPr>
+            <p:cNvSpPr/>
+            <p:nvPr>
+              <p:extLst>
+                <p:ext uri="{386F3935-93C4-4BCD-93E2-E3B085C9AB24}">
+                  <p16:designElem xmlns:p16="http://schemas.microsoft.com/office/powerpoint/2015/main" val="1"/>
+                </p:ext>
+              </p:extLst>
+            </p:nvPr>
+          </p:nvSpPr>
+          <p:spPr>
+            <a:xfrm>
+              <a:off x="329184" y="1"/>
+              <a:ext cx="524256" cy="5532119"/>
+            </a:xfrm>
+            <a:prstGeom prst="rect">
+              <a:avLst/>
+            </a:prstGeom>
+            <a:solidFill>
+              <a:schemeClr val="accent4"/>
+            </a:solidFill>
+            <a:ln>
+              <a:noFill/>
+            </a:ln>
+          </p:spPr>
+          <p:style>
+            <a:lnRef idx="2">
+              <a:schemeClr val="accent1">
+                <a:shade val="50000"/>
+              </a:schemeClr>
+            </a:lnRef>
+            <a:fillRef idx="1">
+              <a:schemeClr val="accent1"/>
+            </a:fillRef>
+            <a:effectRef idx="0">
+              <a:schemeClr val="accent1"/>
+            </a:effectRef>
+            <a:fontRef idx="minor">
+              <a:schemeClr val="lt1"/>
+            </a:fontRef>
+          </p:style>
+          <p:txBody>
+            <a:bodyPr rtlCol="0" anchor="ctr"/>
+            <a:lstStyle/>
+            <a:p>
+              <a:pPr algn="ctr"/>
+              <a:endParaRPr lang="en-US" dirty="0"/>
+            </a:p>
+          </p:txBody>
+        </p:sp>
+      </p:grpSp>
+      <p:sp>
+        <p:nvSpPr>
+          <p:cNvPr id="18" name="Rectangle 17">
+            <a:extLst>
+              <a:ext uri="{FF2B5EF4-FFF2-40B4-BE49-F238E27FC236}">
+                <a16:creationId xmlns:a16="http://schemas.microsoft.com/office/drawing/2014/main" id="{8ED94938-268E-4C0A-A08A-B3980C78BAEB}"/>
+              </a:ext>
+              <a:ext uri="{C183D7F6-B498-43B3-948B-1728B52AA6E4}">
+                <adec:decorative xmlns:adec="http://schemas.microsoft.com/office/drawing/2017/decorative" val="1"/>
+              </a:ext>
+            </a:extLst>
+          </p:cNvPr>
+          <p:cNvSpPr>
+            <a:spLocks noGrp="1" noRot="1" noChangeAspect="1" noMove="1" noResize="1" noEditPoints="1" noAdjustHandles="1" noChangeArrowheads="1" noChangeShapeType="1" noTextEdit="1"/>
+          </p:cNvSpPr>
+          <p:nvPr>
+            <p:extLst>
+              <p:ext uri="{386F3935-93C4-4BCD-93E2-E3B085C9AB24}">
+                <p16:designElem xmlns:p16="http://schemas.microsoft.com/office/powerpoint/2015/main" val="1"/>
+              </p:ext>
+            </p:extLst>
+          </p:nvPr>
+        </p:nvSpPr>
+        <p:spPr>
+          <a:xfrm>
+            <a:off x="596464" y="318045"/>
+            <a:ext cx="10999072" cy="5325139"/>
+          </a:xfrm>
+          <a:prstGeom prst="rect">
+            <a:avLst/>
+          </a:prstGeom>
+          <a:solidFill>
+            <a:schemeClr val="bg1"/>
+          </a:solidFill>
+          <a:ln>
+            <a:noFill/>
+          </a:ln>
+          <a:effectLst>
+            <a:outerShdw blurRad="139700" dist="127000" dir="5400000" algn="t" rotWithShape="0">
+              <a:prstClr val="black">
+                <a:alpha val="15000"/>
+              </a:prstClr>
+            </a:outerShdw>
+          </a:effectLst>
+        </p:spPr>
+        <p:style>
+          <a:lnRef idx="2">
+            <a:schemeClr val="accent1">
+              <a:shade val="50000"/>
+            </a:schemeClr>
+          </a:lnRef>
+          <a:fillRef idx="1">
+            <a:schemeClr val="accent1"/>
+          </a:fillRef>
+          <a:effectRef idx="0">
+            <a:schemeClr val="accent1"/>
+          </a:effectRef>
+          <a:fontRef idx="minor">
+            <a:schemeClr val="lt1"/>
+          </a:fontRef>
+        </p:style>
+        <p:txBody>
+          <a:bodyPr rtlCol="0" anchor="ctr"/>
+          <a:lstStyle/>
+          <a:p>
+            <a:pPr algn="ctr"/>
+            <a:endParaRPr lang="en-US"/>
+          </a:p>
+        </p:txBody>
+      </p:sp>
+      <p:sp>
+        <p:nvSpPr>
+          <p:cNvPr id="2" name="Title 1">
+            <a:extLst>
+              <a:ext uri="{FF2B5EF4-FFF2-40B4-BE49-F238E27FC236}">
+                <a16:creationId xmlns:a16="http://schemas.microsoft.com/office/drawing/2014/main" id="{389D3BD2-C80A-7C0D-A6E6-7AFBD1EE2EC3}"/>
+              </a:ext>
+            </a:extLst>
+          </p:cNvPr>
+          <p:cNvSpPr>
+            <a:spLocks noGrp="1"/>
+          </p:cNvSpPr>
+          <p:nvPr>
+            <p:ph type="title"/>
+          </p:nvPr>
+        </p:nvSpPr>
+        <p:spPr>
+          <a:xfrm>
+            <a:off x="1060232" y="3941205"/>
+            <a:ext cx="10071536" cy="929750"/>
+          </a:xfrm>
+        </p:spPr>
+        <p:txBody>
+          <a:bodyPr vert="horz" lIns="91440" tIns="45720" rIns="91440" bIns="45720" rtlCol="0" anchor="b">
+            <a:normAutofit/>
+          </a:bodyPr>
+          <a:lstStyle/>
+          <a:p>
+            <a:pPr algn="ctr"/>
+            <a:r>
+              <a:rPr lang="en-US" sz="5200" dirty="0"/>
+              <a:t>Many to many relation</a:t>
+            </a:r>
+          </a:p>
+        </p:txBody>
+      </p:sp>
+      <p:pic>
+        <p:nvPicPr>
+          <p:cNvPr id="7" name="Picture 6" descr="A screenshot of a computer screen&#10;&#10;Description automatically generated with low confidence">
+            <a:extLst>
+              <a:ext uri="{FF2B5EF4-FFF2-40B4-BE49-F238E27FC236}">
+                <a16:creationId xmlns:a16="http://schemas.microsoft.com/office/drawing/2014/main" id="{786230FF-11E6-1E15-8500-556004B053ED}"/>
+              </a:ext>
+            </a:extLst>
+          </p:cNvPr>
+          <p:cNvPicPr>
+            <a:picLocks noChangeAspect="1"/>
+          </p:cNvPicPr>
+          <p:nvPr/>
+        </p:nvPicPr>
+        <p:blipFill>
+          <a:blip r:embed="rId2"/>
+          <a:stretch>
+            <a:fillRect/>
+          </a:stretch>
+        </p:blipFill>
+        <p:spPr>
+          <a:xfrm>
+            <a:off x="897717" y="827376"/>
+            <a:ext cx="5069590" cy="2686881"/>
+          </a:xfrm>
+          <a:prstGeom prst="rect">
+            <a:avLst/>
+          </a:prstGeom>
+        </p:spPr>
+      </p:pic>
+      <p:pic>
+        <p:nvPicPr>
+          <p:cNvPr id="5" name="Content Placeholder 4" descr="A screenshot of a computer screen&#10;&#10;Description automatically generated with low confidence">
+            <a:extLst>
+              <a:ext uri="{FF2B5EF4-FFF2-40B4-BE49-F238E27FC236}">
+                <a16:creationId xmlns:a16="http://schemas.microsoft.com/office/drawing/2014/main" id="{2499FDA8-D5C4-026F-C9E1-C7F9FE48B60F}"/>
+              </a:ext>
+            </a:extLst>
+          </p:cNvPr>
+          <p:cNvPicPr>
+            <a:picLocks noGrp="1" noChangeAspect="1"/>
+          </p:cNvPicPr>
+          <p:nvPr>
+            <p:ph idx="1"/>
+          </p:nvPr>
+        </p:nvPicPr>
+        <p:blipFill>
+          <a:blip r:embed="rId3"/>
+          <a:stretch>
+            <a:fillRect/>
+          </a:stretch>
+        </p:blipFill>
+        <p:spPr>
+          <a:xfrm>
+            <a:off x="6228507" y="746068"/>
+            <a:ext cx="5065776" cy="2849497"/>
+          </a:xfrm>
+          <a:prstGeom prst="rect">
+            <a:avLst/>
+          </a:prstGeom>
+        </p:spPr>
+      </p:pic>
+    </p:spTree>
+    <p:extLst>
+      <p:ext uri="{BB962C8B-B14F-4D97-AF65-F5344CB8AC3E}">
+        <p14:creationId xmlns:p14="http://schemas.microsoft.com/office/powerpoint/2010/main" val="2445855465"/>
+      </p:ext>
+    </p:extLst>
+  </p:cSld>
+  <p:clrMapOvr>
+    <a:masterClrMapping/>
+  </p:clrMapOvr>
+</p:sld>
+</file>
+
+<file path=ppt/slides/slide21.xml><?xml version="1.0" encoding="utf-8"?>
+<p:sld xmlns:a="http://schemas.openxmlformats.org/drawingml/2006/main" xmlns:r="http://schemas.openxmlformats.org/officeDocument/2006/relationships" xmlns:p="http://schemas.openxmlformats.org/presentationml/2006/main">
+  <p:cSld>
+    <p:bg>
+      <p:bgPr>
+        <a:solidFill>
+          <a:schemeClr val="bg1"/>
+        </a:solidFill>
+        <a:effectLst/>
+      </p:bgPr>
+    </p:bg>
+    <p:spTree>
+      <p:nvGrpSpPr>
+        <p:cNvPr id="1" name=""/>
+        <p:cNvGrpSpPr/>
+        <p:nvPr/>
+      </p:nvGrpSpPr>
+      <p:grpSpPr>
+        <a:xfrm>
+          <a:off x="0" y="0"/>
+          <a:ext cx="0" cy="0"/>
+          <a:chOff x="0" y="0"/>
+          <a:chExt cx="0" cy="0"/>
+        </a:xfrm>
+      </p:grpSpPr>
+      <p:sp useBgFill="1">
+        <p:nvSpPr>
+          <p:cNvPr id="18" name="Rectangle 9">
+            <a:extLst>
+              <a:ext uri="{FF2B5EF4-FFF2-40B4-BE49-F238E27FC236}">
+                <a16:creationId xmlns:a16="http://schemas.microsoft.com/office/drawing/2014/main" id="{28D31E1B-0407-4223-9642-0B642CBF57D9}"/>
+              </a:ext>
+              <a:ext uri="{C183D7F6-B498-43B3-948B-1728B52AA6E4}">
+                <adec:decorative xmlns:adec="http://schemas.microsoft.com/office/drawing/2017/decorative" val="1"/>
+              </a:ext>
+            </a:extLst>
+          </p:cNvPr>
+          <p:cNvSpPr>
+            <a:spLocks noGrp="1" noRot="1" noChangeAspect="1" noMove="1" noResize="1" noEditPoints="1" noAdjustHandles="1" noChangeArrowheads="1" noChangeShapeType="1" noTextEdit="1"/>
+          </p:cNvSpPr>
+          <p:nvPr>
+            <p:extLst>
+              <p:ext uri="{386F3935-93C4-4BCD-93E2-E3B085C9AB24}">
+                <p16:designElem xmlns:p16="http://schemas.microsoft.com/office/powerpoint/2015/main" val="1"/>
+              </p:ext>
+            </p:extLst>
+          </p:nvPr>
+        </p:nvSpPr>
+        <p:spPr>
+          <a:xfrm>
+            <a:off x="0" y="0"/>
+            <a:ext cx="12191999" cy="6857365"/>
+          </a:xfrm>
+          <a:prstGeom prst="rect">
+            <a:avLst/>
+          </a:prstGeom>
+          <a:ln>
+            <a:noFill/>
+          </a:ln>
+        </p:spPr>
+        <p:style>
+          <a:lnRef idx="2">
+            <a:schemeClr val="accent1">
+              <a:shade val="50000"/>
+            </a:schemeClr>
+          </a:lnRef>
+          <a:fillRef idx="1">
+            <a:schemeClr val="accent1"/>
+          </a:fillRef>
+          <a:effectRef idx="0">
+            <a:schemeClr val="accent1"/>
+          </a:effectRef>
+          <a:fontRef idx="minor">
+            <a:schemeClr val="lt1"/>
+          </a:fontRef>
+        </p:style>
+        <p:txBody>
+          <a:bodyPr rtlCol="0" anchor="ctr"/>
+          <a:lstStyle/>
+          <a:p>
+            <a:pPr algn="ctr"/>
+            <a:endParaRPr lang="en-US"/>
+          </a:p>
+        </p:txBody>
+      </p:sp>
+      <p:grpSp>
+        <p:nvGrpSpPr>
+          <p:cNvPr id="20" name="Group 11">
+            <a:extLst>
+              <a:ext uri="{FF2B5EF4-FFF2-40B4-BE49-F238E27FC236}">
+                <a16:creationId xmlns:a16="http://schemas.microsoft.com/office/drawing/2014/main" id="{AE1C45F0-260A-458C-96ED-C1F6D2151219}"/>
+              </a:ext>
+              <a:ext uri="{C183D7F6-B498-43B3-948B-1728B52AA6E4}">
+                <adec:decorative xmlns:adec="http://schemas.microsoft.com/office/drawing/2017/decorative" val="1"/>
+              </a:ext>
+            </a:extLst>
+          </p:cNvPr>
+          <p:cNvGrpSpPr>
+            <a:grpSpLocks noGrp="1" noUngrp="1" noRot="1" noChangeAspect="1" noMove="1" noResize="1"/>
+          </p:cNvGrpSpPr>
+          <p:nvPr>
+            <p:extLst>
+              <p:ext uri="{386F3935-93C4-4BCD-93E2-E3B085C9AB24}">
+                <p16:designElem xmlns:p16="http://schemas.microsoft.com/office/powerpoint/2015/main" val="1"/>
+              </p:ext>
+            </p:extLst>
+          </p:nvPr>
+        </p:nvGrpSpPr>
+        <p:grpSpPr>
+          <a:xfrm>
+            <a:off x="4" y="1062849"/>
+            <a:ext cx="731521" cy="673460"/>
+            <a:chOff x="3940602" y="308034"/>
+            <a:chExt cx="2116791" cy="3428999"/>
+          </a:xfrm>
+          <a:solidFill>
+            <a:schemeClr val="accent4"/>
+          </a:solidFill>
+        </p:grpSpPr>
+        <p:sp>
+          <p:nvSpPr>
+            <p:cNvPr id="13" name="Rectangle 12">
+              <a:extLst>
+                <a:ext uri="{FF2B5EF4-FFF2-40B4-BE49-F238E27FC236}">
+                  <a16:creationId xmlns:a16="http://schemas.microsoft.com/office/drawing/2014/main" id="{A6604B49-AD5C-4590-B051-06C8222ECD99}"/>
+                </a:ext>
+                <a:ext uri="{C183D7F6-B498-43B3-948B-1728B52AA6E4}">
+                  <adec:decorative xmlns:adec="http://schemas.microsoft.com/office/drawing/2017/decorative" val="1"/>
+                </a:ext>
+              </a:extLst>
+            </p:cNvPr>
+            <p:cNvSpPr/>
+            <p:nvPr>
+              <p:extLst>
+                <p:ext uri="{386F3935-93C4-4BCD-93E2-E3B085C9AB24}">
+                  <p16:designElem xmlns:p16="http://schemas.microsoft.com/office/powerpoint/2015/main" val="1"/>
+                </p:ext>
+              </p:extLst>
+            </p:nvPr>
+          </p:nvSpPr>
+          <p:spPr>
+            <a:xfrm>
+              <a:off x="3940602" y="308034"/>
+              <a:ext cx="566743" cy="3428999"/>
+            </a:xfrm>
+            <a:prstGeom prst="rect">
+              <a:avLst/>
+            </a:prstGeom>
+            <a:grpFill/>
+            <a:ln>
+              <a:noFill/>
+            </a:ln>
+          </p:spPr>
+          <p:style>
+            <a:lnRef idx="2">
+              <a:schemeClr val="accent1">
+                <a:shade val="50000"/>
+              </a:schemeClr>
+            </a:lnRef>
+            <a:fillRef idx="1">
+              <a:schemeClr val="accent1"/>
+            </a:fillRef>
+            <a:effectRef idx="0">
+              <a:schemeClr val="accent1"/>
+            </a:effectRef>
+            <a:fontRef idx="minor">
+              <a:schemeClr val="lt1"/>
+            </a:fontRef>
+          </p:style>
+          <p:txBody>
+            <a:bodyPr rtlCol="0" anchor="ctr"/>
+            <a:lstStyle/>
+            <a:p>
+              <a:pPr algn="ctr"/>
+              <a:endParaRPr lang="en-US"/>
+            </a:p>
+          </p:txBody>
+        </p:sp>
+        <p:sp>
+          <p:nvSpPr>
+            <p:cNvPr id="22" name="Rectangle 13">
+              <a:extLst>
+                <a:ext uri="{FF2B5EF4-FFF2-40B4-BE49-F238E27FC236}">
+                  <a16:creationId xmlns:a16="http://schemas.microsoft.com/office/drawing/2014/main" id="{743ECCAF-29C5-4537-947C-7EA1292463DB}"/>
+                </a:ext>
+                <a:ext uri="{C183D7F6-B498-43B3-948B-1728B52AA6E4}">
+                  <adec:decorative xmlns:adec="http://schemas.microsoft.com/office/drawing/2017/decorative" val="1"/>
+                </a:ext>
+              </a:extLst>
+            </p:cNvPr>
+            <p:cNvSpPr/>
+            <p:nvPr>
+              <p:extLst>
+                <p:ext uri="{386F3935-93C4-4BCD-93E2-E3B085C9AB24}">
+                  <p16:designElem xmlns:p16="http://schemas.microsoft.com/office/powerpoint/2015/main" val="1"/>
+                </p:ext>
+              </p:extLst>
+            </p:nvPr>
+          </p:nvSpPr>
+          <p:spPr>
+            <a:xfrm>
+              <a:off x="4715626" y="308034"/>
+              <a:ext cx="566743" cy="3428999"/>
+            </a:xfrm>
+            <a:prstGeom prst="rect">
+              <a:avLst/>
+            </a:prstGeom>
+            <a:grpFill/>
+            <a:ln>
+              <a:noFill/>
+            </a:ln>
+          </p:spPr>
+          <p:style>
+            <a:lnRef idx="2">
+              <a:schemeClr val="accent1">
+                <a:shade val="50000"/>
+              </a:schemeClr>
+            </a:lnRef>
+            <a:fillRef idx="1">
+              <a:schemeClr val="accent1"/>
+            </a:fillRef>
+            <a:effectRef idx="0">
+              <a:schemeClr val="accent1"/>
+            </a:effectRef>
+            <a:fontRef idx="minor">
+              <a:schemeClr val="lt1"/>
+            </a:fontRef>
+          </p:style>
+          <p:txBody>
+            <a:bodyPr rtlCol="0" anchor="ctr"/>
+            <a:lstStyle/>
+            <a:p>
+              <a:pPr algn="ctr"/>
+              <a:endParaRPr lang="en-US"/>
+            </a:p>
+          </p:txBody>
+        </p:sp>
+        <p:sp>
+          <p:nvSpPr>
+            <p:cNvPr id="15" name="Rectangle 14">
+              <a:extLst>
+                <a:ext uri="{FF2B5EF4-FFF2-40B4-BE49-F238E27FC236}">
+                  <a16:creationId xmlns:a16="http://schemas.microsoft.com/office/drawing/2014/main" id="{ED49787B-8DE6-4467-AD0A-8DECC6E0C2D6}"/>
+                </a:ext>
+                <a:ext uri="{C183D7F6-B498-43B3-948B-1728B52AA6E4}">
+                  <adec:decorative xmlns:adec="http://schemas.microsoft.com/office/drawing/2017/decorative" val="1"/>
+                </a:ext>
+              </a:extLst>
+            </p:cNvPr>
+            <p:cNvSpPr/>
+            <p:nvPr>
+              <p:extLst>
+                <p:ext uri="{386F3935-93C4-4BCD-93E2-E3B085C9AB24}">
+                  <p16:designElem xmlns:p16="http://schemas.microsoft.com/office/powerpoint/2015/main" val="1"/>
+                </p:ext>
+              </p:extLst>
+            </p:nvPr>
+          </p:nvSpPr>
+          <p:spPr>
+            <a:xfrm>
+              <a:off x="5490650" y="308034"/>
+              <a:ext cx="566743" cy="3428999"/>
+            </a:xfrm>
+            <a:prstGeom prst="rect">
+              <a:avLst/>
+            </a:prstGeom>
+            <a:grpFill/>
+            <a:ln>
+              <a:noFill/>
+            </a:ln>
+          </p:spPr>
+          <p:style>
+            <a:lnRef idx="2">
+              <a:schemeClr val="accent1">
+                <a:shade val="50000"/>
+              </a:schemeClr>
+            </a:lnRef>
+            <a:fillRef idx="1">
+              <a:schemeClr val="accent1"/>
+            </a:fillRef>
+            <a:effectRef idx="0">
+              <a:schemeClr val="accent1"/>
+            </a:effectRef>
+            <a:fontRef idx="minor">
+              <a:schemeClr val="lt1"/>
+            </a:fontRef>
+          </p:style>
+          <p:txBody>
+            <a:bodyPr rtlCol="0" anchor="ctr"/>
+            <a:lstStyle/>
+            <a:p>
+              <a:pPr algn="ctr"/>
+              <a:endParaRPr lang="en-US"/>
+            </a:p>
+          </p:txBody>
+        </p:sp>
+      </p:grpSp>
+      <p:sp>
+        <p:nvSpPr>
+          <p:cNvPr id="17" name="Rectangle 16">
+            <a:extLst>
+              <a:ext uri="{FF2B5EF4-FFF2-40B4-BE49-F238E27FC236}">
+                <a16:creationId xmlns:a16="http://schemas.microsoft.com/office/drawing/2014/main" id="{D5B0017B-2ECA-49AF-B397-DC140825DF8D}"/>
+              </a:ext>
+              <a:ext uri="{C183D7F6-B498-43B3-948B-1728B52AA6E4}">
+                <adec:decorative xmlns:adec="http://schemas.microsoft.com/office/drawing/2017/decorative" val="1"/>
+              </a:ext>
+            </a:extLst>
+          </p:cNvPr>
+          <p:cNvSpPr>
+            <a:spLocks noGrp="1" noRot="1" noChangeAspect="1" noMove="1" noResize="1" noEditPoints="1" noAdjustHandles="1" noChangeArrowheads="1" noChangeShapeType="1" noTextEdit="1"/>
+          </p:cNvSpPr>
+          <p:nvPr>
+            <p:extLst>
+              <p:ext uri="{386F3935-93C4-4BCD-93E2-E3B085C9AB24}">
+                <p16:designElem xmlns:p16="http://schemas.microsoft.com/office/powerpoint/2015/main" val="1"/>
+              </p:ext>
+            </p:extLst>
+          </p:nvPr>
+        </p:nvSpPr>
+        <p:spPr>
+          <a:xfrm>
+            <a:off x="640080" y="656150"/>
+            <a:ext cx="5672667" cy="1431591"/>
+          </a:xfrm>
+          <a:prstGeom prst="rect">
+            <a:avLst/>
+          </a:prstGeom>
+          <a:solidFill>
+            <a:schemeClr val="bg1"/>
+          </a:solidFill>
+          <a:ln>
+            <a:noFill/>
+          </a:ln>
+          <a:effectLst>
+            <a:outerShdw blurRad="139700" dist="127000" dir="5400000" algn="t" rotWithShape="0">
+              <a:prstClr val="black">
+                <a:alpha val="15000"/>
+              </a:prstClr>
+            </a:outerShdw>
+          </a:effectLst>
+        </p:spPr>
+        <p:style>
+          <a:lnRef idx="2">
+            <a:schemeClr val="accent1">
+              <a:shade val="50000"/>
+            </a:schemeClr>
+          </a:lnRef>
+          <a:fillRef idx="1">
+            <a:schemeClr val="accent1"/>
+          </a:fillRef>
+          <a:effectRef idx="0">
+            <a:schemeClr val="accent1"/>
+          </a:effectRef>
+          <a:fontRef idx="minor">
+            <a:schemeClr val="lt1"/>
+          </a:fontRef>
+        </p:style>
+        <p:txBody>
+          <a:bodyPr rtlCol="0" anchor="ctr"/>
+          <a:lstStyle/>
+          <a:p>
+            <a:pPr algn="ctr"/>
+            <a:endParaRPr lang="en-US"/>
+          </a:p>
+        </p:txBody>
+      </p:sp>
+      <p:sp>
+        <p:nvSpPr>
+          <p:cNvPr id="2" name="Title 1">
+            <a:extLst>
+              <a:ext uri="{FF2B5EF4-FFF2-40B4-BE49-F238E27FC236}">
+                <a16:creationId xmlns:a16="http://schemas.microsoft.com/office/drawing/2014/main" id="{389D3BD2-C80A-7C0D-A6E6-7AFBD1EE2EC3}"/>
+              </a:ext>
+            </a:extLst>
+          </p:cNvPr>
+          <p:cNvSpPr>
+            <a:spLocks noGrp="1"/>
+          </p:cNvSpPr>
+          <p:nvPr>
+            <p:ph type="title"/>
+          </p:nvPr>
+        </p:nvSpPr>
+        <p:spPr>
+          <a:xfrm>
+            <a:off x="1043631" y="873940"/>
+            <a:ext cx="5052369" cy="1035781"/>
+          </a:xfrm>
+        </p:spPr>
+        <p:txBody>
+          <a:bodyPr anchor="ctr">
+            <a:normAutofit/>
+          </a:bodyPr>
+          <a:lstStyle/>
+          <a:p>
+            <a:r>
+              <a:rPr lang="en-US" sz="3600"/>
+              <a:t>M</a:t>
+            </a:r>
+            <a:r>
+              <a:rPr lang="en-IL" sz="3600"/>
+              <a:t>ore info</a:t>
+            </a:r>
+          </a:p>
+        </p:txBody>
+      </p:sp>
+      <p:sp>
+        <p:nvSpPr>
+          <p:cNvPr id="3" name="Content Placeholder 2">
+            <a:extLst>
+              <a:ext uri="{FF2B5EF4-FFF2-40B4-BE49-F238E27FC236}">
+                <a16:creationId xmlns:a16="http://schemas.microsoft.com/office/drawing/2014/main" id="{1995ABE4-AADB-D980-22AF-25D3DDE0D42C}"/>
+              </a:ext>
+            </a:extLst>
+          </p:cNvPr>
+          <p:cNvSpPr>
+            <a:spLocks noGrp="1"/>
+          </p:cNvSpPr>
+          <p:nvPr>
+            <p:ph idx="1"/>
+          </p:nvPr>
+        </p:nvSpPr>
+        <p:spPr>
+          <a:xfrm>
+            <a:off x="1045029" y="2524721"/>
+            <a:ext cx="4991629" cy="3677123"/>
+          </a:xfrm>
+        </p:spPr>
+        <p:txBody>
+          <a:bodyPr anchor="ctr">
+            <a:normAutofit/>
+          </a:bodyPr>
+          <a:lstStyle/>
+          <a:p>
+            <a:r>
+              <a:rPr lang="en-US" sz="1800"/>
+              <a:t>In this example, the customer_id column in the orders table establishes the one-to-many relationship between the two tables. Each record in the orders table is associated with one record in the customers table, but each record in the customers table can be associated with multiple records in the orders table.</a:t>
+            </a:r>
+          </a:p>
+          <a:p>
+            <a:r>
+              <a:rPr lang="en-US" sz="1800"/>
+              <a:t>Note that in this type of relationship, the primary key of the table on the "one" side (in this case, the id column in the customers table) becomes a foreign key in the table on the "many" side (in this case, the customer_id column in the orders table). This foreign key is used to establish the relationship between the two tables.</a:t>
+            </a:r>
+          </a:p>
+        </p:txBody>
+      </p:sp>
+      <p:sp>
+        <p:nvSpPr>
+          <p:cNvPr id="19" name="Rectangle 18">
+            <a:extLst>
+              <a:ext uri="{FF2B5EF4-FFF2-40B4-BE49-F238E27FC236}">
+                <a16:creationId xmlns:a16="http://schemas.microsoft.com/office/drawing/2014/main" id="{70E96339-907C-46C3-99AC-31179B6F0EBD}"/>
+              </a:ext>
+              <a:ext uri="{C183D7F6-B498-43B3-948B-1728B52AA6E4}">
+                <adec:decorative xmlns:adec="http://schemas.microsoft.com/office/drawing/2017/decorative" val="1"/>
+              </a:ext>
+            </a:extLst>
+          </p:cNvPr>
+          <p:cNvSpPr>
+            <a:spLocks noGrp="1" noRot="1" noChangeAspect="1" noMove="1" noResize="1" noEditPoints="1" noAdjustHandles="1" noChangeArrowheads="1" noChangeShapeType="1" noTextEdit="1"/>
+          </p:cNvSpPr>
+          <p:nvPr>
+            <p:extLst>
+              <p:ext uri="{386F3935-93C4-4BCD-93E2-E3B085C9AB24}">
+                <p16:designElem xmlns:p16="http://schemas.microsoft.com/office/powerpoint/2015/main" val="1"/>
+              </p:ext>
+            </p:extLst>
+          </p:nvPr>
+        </p:nvSpPr>
+        <p:spPr>
+          <a:xfrm>
+            <a:off x="6716299" y="608401"/>
+            <a:ext cx="4637502" cy="5593443"/>
+          </a:xfrm>
+          <a:prstGeom prst="rect">
+            <a:avLst/>
+          </a:prstGeom>
+          <a:solidFill>
+            <a:schemeClr val="bg1"/>
+          </a:solidFill>
+          <a:ln>
+            <a:noFill/>
+          </a:ln>
+          <a:effectLst>
+            <a:outerShdw blurRad="139700" dist="127000" dir="5400000" algn="t" rotWithShape="0">
+              <a:prstClr val="black">
+                <a:alpha val="15000"/>
+              </a:prstClr>
+            </a:outerShdw>
+          </a:effectLst>
+        </p:spPr>
+        <p:style>
+          <a:lnRef idx="2">
+            <a:schemeClr val="accent1">
+              <a:shade val="50000"/>
+            </a:schemeClr>
+          </a:lnRef>
+          <a:fillRef idx="1">
+            <a:schemeClr val="accent1"/>
+          </a:fillRef>
+          <a:effectRef idx="0">
+            <a:schemeClr val="accent1"/>
+          </a:effectRef>
+          <a:fontRef idx="minor">
+            <a:schemeClr val="lt1"/>
+          </a:fontRef>
+        </p:style>
+        <p:txBody>
+          <a:bodyPr rtlCol="0" anchor="ctr"/>
+          <a:lstStyle/>
+          <a:p>
+            <a:pPr algn="ctr"/>
+            <a:endParaRPr lang="en-US"/>
+          </a:p>
+        </p:txBody>
+      </p:sp>
+      <p:pic>
+        <p:nvPicPr>
+          <p:cNvPr id="23" name="Graphic 6" descr="Table">
+            <a:extLst>
+              <a:ext uri="{FF2B5EF4-FFF2-40B4-BE49-F238E27FC236}">
+                <a16:creationId xmlns:a16="http://schemas.microsoft.com/office/drawing/2014/main" id="{019594B0-10CF-F1A5-4C85-C78089597F89}"/>
+              </a:ext>
+            </a:extLst>
+          </p:cNvPr>
+          <p:cNvPicPr>
+            <a:picLocks noChangeAspect="1"/>
+          </p:cNvPicPr>
+          <p:nvPr/>
+        </p:nvPicPr>
+        <p:blipFill>
+          <a:blip r:embed="rId2">
+            <a:extLst>
+              <a:ext uri="{28A0092B-C50C-407E-A947-70E740481C1C}">
+                <a14:useLocalDpi xmlns:a14="http://schemas.microsoft.com/office/drawing/2010/main" val="0"/>
+              </a:ext>
+              <a:ext uri="{96DAC541-7B7A-43D3-8B79-37D633B846F1}">
+                <asvg:svgBlip xmlns:asvg="http://schemas.microsoft.com/office/drawing/2016/SVG/main" r:embed="rId3"/>
+              </a:ext>
+            </a:extLst>
+          </a:blip>
+          <a:stretch>
+            <a:fillRect/>
+          </a:stretch>
+        </p:blipFill>
+        <p:spPr>
+          <a:xfrm>
+            <a:off x="6930493" y="1347516"/>
+            <a:ext cx="4223252" cy="4223252"/>
+          </a:xfrm>
+          <a:prstGeom prst="rect">
+            <a:avLst/>
+          </a:prstGeom>
+        </p:spPr>
+      </p:pic>
+      <p:cxnSp>
+        <p:nvCxnSpPr>
+          <p:cNvPr id="21" name="Straight Connector 20">
+            <a:extLst>
+              <a:ext uri="{FF2B5EF4-FFF2-40B4-BE49-F238E27FC236}">
+                <a16:creationId xmlns:a16="http://schemas.microsoft.com/office/drawing/2014/main" id="{6CF1BAF6-AD41-4082-B212-8A1F9A2E8779}"/>
+              </a:ext>
+              <a:ext uri="{C183D7F6-B498-43B3-948B-1728B52AA6E4}">
+                <adec:decorative xmlns:adec="http://schemas.microsoft.com/office/drawing/2017/decorative" val="1"/>
+              </a:ext>
+            </a:extLst>
+          </p:cNvPr>
+          <p:cNvCxnSpPr>
+            <a:cxnSpLocks noGrp="1" noRot="1" noChangeAspect="1" noMove="1" noResize="1" noEditPoints="1" noAdjustHandles="1" noChangeArrowheads="1" noChangeShapeType="1"/>
+          </p:cNvCxnSpPr>
+          <p:nvPr>
+            <p:extLst>
+              <p:ext uri="{386F3935-93C4-4BCD-93E2-E3B085C9AB24}">
+                <p16:designElem xmlns:p16="http://schemas.microsoft.com/office/powerpoint/2015/main" val="1"/>
+              </p:ext>
+            </p:extLst>
+          </p:nvPr>
+        </p:nvCxnSpPr>
+        <p:spPr>
+          <a:xfrm flipH="1">
+            <a:off x="838200" y="6492240"/>
+            <a:ext cx="10515600" cy="0"/>
+          </a:xfrm>
+          <a:prstGeom prst="line">
+            <a:avLst/>
+          </a:prstGeom>
+          <a:ln w="57150">
+            <a:solidFill>
+              <a:schemeClr val="accent4"/>
+            </a:solidFill>
+          </a:ln>
+        </p:spPr>
+        <p:style>
+          <a:lnRef idx="1">
+            <a:schemeClr val="accent1"/>
+          </a:lnRef>
+          <a:fillRef idx="0">
+            <a:schemeClr val="accent1"/>
+          </a:fillRef>
+          <a:effectRef idx="0">
+            <a:schemeClr val="accent1"/>
+          </a:effectRef>
+          <a:fontRef idx="minor">
+            <a:schemeClr val="tx1"/>
+          </a:fontRef>
+        </p:style>
+      </p:cxnSp>
+    </p:spTree>
+    <p:extLst>
+      <p:ext uri="{BB962C8B-B14F-4D97-AF65-F5344CB8AC3E}">
+        <p14:creationId xmlns:p14="http://schemas.microsoft.com/office/powerpoint/2010/main" val="2761682595"/>
+      </p:ext>
+    </p:extLst>
+  </p:cSld>
+  <p:clrMapOvr>
+    <a:masterClrMapping/>
+  </p:clrMapOvr>
+</p:sld>
+</file>
+
+<file path=ppt/slides/slide22.xml><?xml version="1.0" encoding="utf-8"?>
+<p:sld xmlns:a="http://schemas.openxmlformats.org/drawingml/2006/main" xmlns:r="http://schemas.openxmlformats.org/officeDocument/2006/relationships" xmlns:p="http://schemas.openxmlformats.org/presentationml/2006/main">
+  <p:cSld>
+    <p:spTree>
+      <p:nvGrpSpPr>
+        <p:cNvPr id="1" name=""/>
+        <p:cNvGrpSpPr/>
+        <p:nvPr/>
+      </p:nvGrpSpPr>
+      <p:grpSpPr>
+        <a:xfrm>
+          <a:off x="0" y="0"/>
+          <a:ext cx="0" cy="0"/>
+          <a:chOff x="0" y="0"/>
+          <a:chExt cx="0" cy="0"/>
+        </a:xfrm>
+      </p:grpSpPr>
+      <p:sp>
+        <p:nvSpPr>
+          <p:cNvPr id="2" name="Title 1">
+            <a:extLst>
+              <a:ext uri="{FF2B5EF4-FFF2-40B4-BE49-F238E27FC236}">
+                <a16:creationId xmlns:a16="http://schemas.microsoft.com/office/drawing/2014/main" id="{389D3BD2-C80A-7C0D-A6E6-7AFBD1EE2EC3}"/>
+              </a:ext>
+            </a:extLst>
+          </p:cNvPr>
+          <p:cNvSpPr>
+            <a:spLocks noGrp="1"/>
+          </p:cNvSpPr>
+          <p:nvPr>
+            <p:ph type="title"/>
+          </p:nvPr>
+        </p:nvSpPr>
+        <p:spPr/>
+        <p:txBody>
+          <a:bodyPr/>
+          <a:lstStyle/>
+          <a:p>
+            <a:endParaRPr lang="en-IL"/>
+          </a:p>
+        </p:txBody>
+      </p:sp>
+      <p:sp>
+        <p:nvSpPr>
+          <p:cNvPr id="3" name="Content Placeholder 2">
+            <a:extLst>
+              <a:ext uri="{FF2B5EF4-FFF2-40B4-BE49-F238E27FC236}">
+                <a16:creationId xmlns:a16="http://schemas.microsoft.com/office/drawing/2014/main" id="{1995ABE4-AADB-D980-22AF-25D3DDE0D42C}"/>
+              </a:ext>
+            </a:extLst>
+          </p:cNvPr>
+          <p:cNvSpPr>
+            <a:spLocks noGrp="1"/>
+          </p:cNvSpPr>
+          <p:nvPr>
+            <p:ph idx="1"/>
+          </p:nvPr>
+        </p:nvSpPr>
+        <p:spPr/>
+        <p:txBody>
+          <a:bodyPr/>
+          <a:lstStyle/>
+          <a:p>
+            <a:endParaRPr lang="en-IL"/>
+          </a:p>
+        </p:txBody>
+      </p:sp>
+    </p:spTree>
+    <p:extLst>
+      <p:ext uri="{BB962C8B-B14F-4D97-AF65-F5344CB8AC3E}">
+        <p14:creationId xmlns:p14="http://schemas.microsoft.com/office/powerpoint/2010/main" val="2912681694"/>
+      </p:ext>
+    </p:extLst>
+  </p:cSld>
+  <p:clrMapOvr>
+    <a:masterClrMapping/>
+  </p:clrMapOvr>
+</p:sld>
+</file>
+
+<file path=ppt/slides/slide23.xml><?xml version="1.0" encoding="utf-8"?>
+<p:sld xmlns:a="http://schemas.openxmlformats.org/drawingml/2006/main" xmlns:r="http://schemas.openxmlformats.org/officeDocument/2006/relationships" xmlns:p="http://schemas.openxmlformats.org/presentationml/2006/main">
+  <p:cSld>
+    <p:spTree>
+      <p:nvGrpSpPr>
+        <p:cNvPr id="1" name=""/>
+        <p:cNvGrpSpPr/>
+        <p:nvPr/>
+      </p:nvGrpSpPr>
+      <p:grpSpPr>
+        <a:xfrm>
+          <a:off x="0" y="0"/>
+          <a:ext cx="0" cy="0"/>
+          <a:chOff x="0" y="0"/>
+          <a:chExt cx="0" cy="0"/>
+        </a:xfrm>
+      </p:grpSpPr>
+      <p:sp>
+        <p:nvSpPr>
+          <p:cNvPr id="2" name="Title 1">
+            <a:extLst>
+              <a:ext uri="{FF2B5EF4-FFF2-40B4-BE49-F238E27FC236}">
+                <a16:creationId xmlns:a16="http://schemas.microsoft.com/office/drawing/2014/main" id="{389D3BD2-C80A-7C0D-A6E6-7AFBD1EE2EC3}"/>
+              </a:ext>
+            </a:extLst>
+          </p:cNvPr>
+          <p:cNvSpPr>
+            <a:spLocks noGrp="1"/>
+          </p:cNvSpPr>
+          <p:nvPr>
+            <p:ph type="title"/>
+          </p:nvPr>
+        </p:nvSpPr>
+        <p:spPr/>
+        <p:txBody>
+          <a:bodyPr/>
+          <a:lstStyle/>
+          <a:p>
+            <a:endParaRPr lang="en-IL"/>
+          </a:p>
+        </p:txBody>
+      </p:sp>
+      <p:sp>
+        <p:nvSpPr>
+          <p:cNvPr id="3" name="Content Placeholder 2">
+            <a:extLst>
+              <a:ext uri="{FF2B5EF4-FFF2-40B4-BE49-F238E27FC236}">
+                <a16:creationId xmlns:a16="http://schemas.microsoft.com/office/drawing/2014/main" id="{1995ABE4-AADB-D980-22AF-25D3DDE0D42C}"/>
+              </a:ext>
+            </a:extLst>
+          </p:cNvPr>
+          <p:cNvSpPr>
+            <a:spLocks noGrp="1"/>
+          </p:cNvSpPr>
+          <p:nvPr>
+            <p:ph idx="1"/>
+          </p:nvPr>
+        </p:nvSpPr>
+        <p:spPr/>
+        <p:txBody>
+          <a:bodyPr/>
+          <a:lstStyle/>
+          <a:p>
+            <a:endParaRPr lang="en-IL"/>
+          </a:p>
+        </p:txBody>
+      </p:sp>
+    </p:spTree>
+    <p:extLst>
+      <p:ext uri="{BB962C8B-B14F-4D97-AF65-F5344CB8AC3E}">
+        <p14:creationId xmlns:p14="http://schemas.microsoft.com/office/powerpoint/2010/main" val="4068046381"/>
       </p:ext>
     </p:extLst>
   </p:cSld>
@@ -3650,17 +6848,17 @@
                 <a:ea typeface="+mj-ea"/>
                 <a:cs typeface="+mj-cs"/>
               </a:rPr>
-              <a:t>Narrowing types options</a:t>
+              <a:t>Vite folder and files</a:t>
             </a:r>
           </a:p>
         </p:txBody>
       </p:sp>
       <p:pic>
         <p:nvPicPr>
-          <p:cNvPr id="5" name="Content Placeholder 4" descr="A picture containing graphical user interface&#10;&#10;Description automatically generated">
-            <a:extLst>
-              <a:ext uri="{FF2B5EF4-FFF2-40B4-BE49-F238E27FC236}">
-                <a16:creationId xmlns:a16="http://schemas.microsoft.com/office/drawing/2014/main" id="{06D0B032-F8D7-B187-BEB8-F5BE32023EFB}"/>
+          <p:cNvPr id="5" name="Content Placeholder 4" descr="A screenshot of a computer screen&#10;&#10;Description automatically generated with medium confidence">
+            <a:extLst>
+              <a:ext uri="{FF2B5EF4-FFF2-40B4-BE49-F238E27FC236}">
+                <a16:creationId xmlns:a16="http://schemas.microsoft.com/office/drawing/2014/main" id="{99CB9B14-0C11-1069-D28D-8B4C7980F45A}"/>
               </a:ext>
             </a:extLst>
           </p:cNvPr>
@@ -3679,8 +6877,8 @@
         </p:blipFill>
         <p:spPr>
           <a:xfrm>
-            <a:off x="5564281" y="643466"/>
-            <a:ext cx="5206769" cy="5568739"/>
+            <a:off x="5988897" y="643466"/>
+            <a:ext cx="4357537" cy="5568739"/>
           </a:xfrm>
           <a:prstGeom prst="rect">
             <a:avLst/>
@@ -3690,7 +6888,7 @@
     </p:spTree>
     <p:extLst>
       <p:ext uri="{BB962C8B-B14F-4D97-AF65-F5344CB8AC3E}">
-        <p14:creationId xmlns:p14="http://schemas.microsoft.com/office/powerpoint/2010/main" val="2696312600"/>
+        <p14:creationId xmlns:p14="http://schemas.microsoft.com/office/powerpoint/2010/main" val="102664561"/>
       </p:ext>
     </p:extLst>
   </p:cSld>
@@ -3701,6 +6899,241 @@
 </file>
 
 <file path=ppt/slides/slide4.xml><?xml version="1.0" encoding="utf-8"?>
+<p:sld xmlns:a="http://schemas.openxmlformats.org/drawingml/2006/main" xmlns:r="http://schemas.openxmlformats.org/officeDocument/2006/relationships" xmlns:p="http://schemas.openxmlformats.org/presentationml/2006/main">
+  <p:cSld>
+    <p:spTree>
+      <p:nvGrpSpPr>
+        <p:cNvPr id="1" name=""/>
+        <p:cNvGrpSpPr/>
+        <p:nvPr/>
+      </p:nvGrpSpPr>
+      <p:grpSpPr>
+        <a:xfrm>
+          <a:off x="0" y="0"/>
+          <a:ext cx="0" cy="0"/>
+          <a:chOff x="0" y="0"/>
+          <a:chExt cx="0" cy="0"/>
+        </a:xfrm>
+      </p:grpSpPr>
+      <p:sp>
+        <p:nvSpPr>
+          <p:cNvPr id="2" name="Title 1">
+            <a:extLst>
+              <a:ext uri="{FF2B5EF4-FFF2-40B4-BE49-F238E27FC236}">
+                <a16:creationId xmlns:a16="http://schemas.microsoft.com/office/drawing/2014/main" id="{05177CD8-1577-1B43-6A99-F30DDB7D00C4}"/>
+              </a:ext>
+            </a:extLst>
+          </p:cNvPr>
+          <p:cNvSpPr>
+            <a:spLocks noGrp="1"/>
+          </p:cNvSpPr>
+          <p:nvPr>
+            <p:ph type="title"/>
+          </p:nvPr>
+        </p:nvSpPr>
+        <p:spPr/>
+        <p:txBody>
+          <a:bodyPr/>
+          <a:lstStyle/>
+          <a:p>
+            <a:r>
+              <a:rPr lang="en-US" dirty="0"/>
+              <a:t>create multiple pages</a:t>
+            </a:r>
+            <a:endParaRPr lang="en-IL" dirty="0"/>
+          </a:p>
+        </p:txBody>
+      </p:sp>
+      <p:sp>
+        <p:nvSpPr>
+          <p:cNvPr id="3" name="Content Placeholder 2">
+            <a:extLst>
+              <a:ext uri="{FF2B5EF4-FFF2-40B4-BE49-F238E27FC236}">
+                <a16:creationId xmlns:a16="http://schemas.microsoft.com/office/drawing/2014/main" id="{85368711-2939-027B-EE1D-0F7E948016DF}"/>
+              </a:ext>
+            </a:extLst>
+          </p:cNvPr>
+          <p:cNvSpPr>
+            <a:spLocks noGrp="1"/>
+          </p:cNvSpPr>
+          <p:nvPr>
+            <p:ph idx="1"/>
+          </p:nvPr>
+        </p:nvSpPr>
+        <p:spPr/>
+        <p:txBody>
+          <a:bodyPr>
+            <a:normAutofit fontScale="92500"/>
+          </a:bodyPr>
+          <a:lstStyle/>
+          <a:p>
+            <a:pPr algn="l"/>
+            <a:r>
+              <a:rPr lang="en-US" b="0" i="0" dirty="0">
+                <a:effectLst/>
+                <a:latin typeface="Söhne"/>
+              </a:rPr>
+              <a:t>To create multiple pages in a </a:t>
+            </a:r>
+            <a:r>
+              <a:rPr lang="en-US" b="0" i="0" dirty="0" err="1">
+                <a:effectLst/>
+                <a:latin typeface="Söhne"/>
+              </a:rPr>
+              <a:t>Vite</a:t>
+            </a:r>
+            <a:r>
+              <a:rPr lang="en-US" b="0" i="0" dirty="0">
+                <a:effectLst/>
+                <a:latin typeface="Söhne"/>
+              </a:rPr>
+              <a:t> vanilla TypeScript project, you can follow these steps:</a:t>
+            </a:r>
+          </a:p>
+          <a:p>
+            <a:pPr algn="l">
+              <a:buFont typeface="+mj-lt"/>
+              <a:buAutoNum type="arabicPeriod"/>
+            </a:pPr>
+            <a:r>
+              <a:rPr lang="en-US" b="0" i="0" dirty="0">
+                <a:effectLst/>
+                <a:latin typeface="Söhne"/>
+              </a:rPr>
+              <a:t>Create a new directory inside the </a:t>
+            </a:r>
+            <a:r>
+              <a:rPr lang="en-US" b="0" i="0" dirty="0" err="1">
+                <a:effectLst/>
+                <a:latin typeface="Söhne"/>
+              </a:rPr>
+              <a:t>src</a:t>
+            </a:r>
+            <a:r>
+              <a:rPr lang="en-US" b="0" i="0" dirty="0">
+                <a:effectLst/>
+                <a:latin typeface="Söhne"/>
+              </a:rPr>
+              <a:t> folder for each page you want to create. For example, you might create a directory called home for your homepage, and a directory called about for your about page.</a:t>
+            </a:r>
+          </a:p>
+          <a:p>
+            <a:pPr algn="l">
+              <a:buFont typeface="+mj-lt"/>
+              <a:buAutoNum type="arabicPeriod"/>
+            </a:pPr>
+            <a:r>
+              <a:rPr lang="en-US" b="0" i="0" dirty="0">
+                <a:effectLst/>
+                <a:latin typeface="Söhne"/>
+              </a:rPr>
+              <a:t>Inside each directory, create an </a:t>
+            </a:r>
+            <a:r>
+              <a:rPr lang="en-US" b="0" i="0" dirty="0" err="1">
+                <a:effectLst/>
+                <a:latin typeface="Söhne"/>
+              </a:rPr>
+              <a:t>index.html</a:t>
+            </a:r>
+            <a:r>
+              <a:rPr lang="en-US" b="0" i="0" dirty="0">
+                <a:effectLst/>
+                <a:latin typeface="Söhne"/>
+              </a:rPr>
+              <a:t> file that represents the HTML content of that page.</a:t>
+            </a:r>
+          </a:p>
+          <a:p>
+            <a:pPr algn="l">
+              <a:buFont typeface="+mj-lt"/>
+              <a:buAutoNum type="arabicPeriod"/>
+            </a:pPr>
+            <a:r>
+              <a:rPr lang="en-US" b="0" i="0" dirty="0">
+                <a:effectLst/>
+                <a:latin typeface="Söhne"/>
+              </a:rPr>
+              <a:t>If you want to add any custom JavaScript for a particular page, create a new .</a:t>
+            </a:r>
+            <a:r>
+              <a:rPr lang="en-US" b="0" i="0" dirty="0" err="1">
+                <a:effectLst/>
+                <a:latin typeface="Söhne"/>
+              </a:rPr>
+              <a:t>ts</a:t>
+            </a:r>
+            <a:r>
+              <a:rPr lang="en-US" b="0" i="0" dirty="0">
+                <a:effectLst/>
+                <a:latin typeface="Söhne"/>
+              </a:rPr>
+              <a:t> file in the corresponding directory, such as </a:t>
+            </a:r>
+            <a:r>
+              <a:rPr lang="en-US" b="0" i="0" dirty="0" err="1">
+                <a:effectLst/>
+                <a:latin typeface="Söhne"/>
+              </a:rPr>
+              <a:t>home.ts</a:t>
+            </a:r>
+            <a:r>
+              <a:rPr lang="en-US" b="0" i="0" dirty="0">
+                <a:effectLst/>
+                <a:latin typeface="Söhne"/>
+              </a:rPr>
+              <a:t> or </a:t>
+            </a:r>
+            <a:r>
+              <a:rPr lang="en-US" b="0" i="0" dirty="0" err="1">
+                <a:effectLst/>
+                <a:latin typeface="Söhne"/>
+              </a:rPr>
+              <a:t>about.ts</a:t>
+            </a:r>
+            <a:r>
+              <a:rPr lang="en-US" b="0" i="0" dirty="0">
+                <a:effectLst/>
+                <a:latin typeface="Söhne"/>
+              </a:rPr>
+              <a:t>.</a:t>
+            </a:r>
+          </a:p>
+          <a:p>
+            <a:pPr algn="l">
+              <a:buFont typeface="+mj-lt"/>
+              <a:buAutoNum type="arabicPeriod"/>
+            </a:pPr>
+            <a:r>
+              <a:rPr lang="en-US" b="0" i="0" dirty="0">
+                <a:effectLst/>
+                <a:latin typeface="Söhne"/>
+              </a:rPr>
+              <a:t>Add any necessary CSS files or other assets to the page directory.</a:t>
+            </a:r>
+          </a:p>
+          <a:p>
+            <a:pPr marL="0" indent="0">
+              <a:buNone/>
+            </a:pPr>
+            <a:endParaRPr lang="en-IL" dirty="0"/>
+          </a:p>
+        </p:txBody>
+      </p:sp>
+    </p:spTree>
+    <p:extLst>
+      <p:ext uri="{BB962C8B-B14F-4D97-AF65-F5344CB8AC3E}">
+        <p14:creationId xmlns:p14="http://schemas.microsoft.com/office/powerpoint/2010/main" val="749222942"/>
+      </p:ext>
+    </p:extLst>
+  </p:cSld>
+  <p:clrMapOvr>
+    <a:masterClrMapping/>
+  </p:clrMapOvr>
+</p:sld>
+</file>
+
+<file path=ppt/slides/slide5.xml><?xml version="1.0" encoding="utf-8"?>
 <p:sld xmlns:a="http://schemas.openxmlformats.org/drawingml/2006/main" xmlns:r="http://schemas.openxmlformats.org/officeDocument/2006/relationships" xmlns:p="http://schemas.openxmlformats.org/presentationml/2006/main">
   <p:cSld>
     <p:bg>
@@ -3725,12 +7158,12 @@
           <a:chExt cx="0" cy="0"/>
         </a:xfrm>
       </p:grpSpPr>
-      <p:sp>
+      <p:sp useBgFill="1">
         <p:nvSpPr>
           <p:cNvPr id="10" name="Rectangle 9">
             <a:extLst>
               <a:ext uri="{FF2B5EF4-FFF2-40B4-BE49-F238E27FC236}">
-                <a16:creationId xmlns:a16="http://schemas.microsoft.com/office/drawing/2014/main" id="{A4AC5506-6312-4701-8D3C-40187889A947}"/>
+                <a16:creationId xmlns:a16="http://schemas.microsoft.com/office/drawing/2014/main" id="{2B97F24A-32CE-4C1C-A50D-3016B394DCFB}"/>
               </a:ext>
               <a:ext uri="{C183D7F6-B498-43B3-948B-1728B52AA6E4}">
                 <adec:decorative xmlns:adec="http://schemas.microsoft.com/office/drawing/2017/decorative" val="1"/>
@@ -3750,15 +7183,12 @@
         </p:nvSpPr>
         <p:spPr>
           <a:xfrm>
-            <a:off x="0" y="651752"/>
-            <a:ext cx="12192000" cy="736551"/>
+            <a:off x="0" y="0"/>
+            <a:ext cx="12192000" cy="6858000"/>
           </a:xfrm>
           <a:prstGeom prst="rect">
             <a:avLst/>
           </a:prstGeom>
-          <a:solidFill>
-            <a:schemeClr val="tx1"/>
-          </a:solidFill>
           <a:ln>
             <a:noFill/>
           </a:ln>
@@ -3806,46 +7236,345 @@
         </p:nvSpPr>
         <p:spPr>
           <a:xfrm>
-            <a:off x="556532" y="643467"/>
-            <a:ext cx="11210925" cy="744836"/>
+            <a:off x="630936" y="639520"/>
+            <a:ext cx="3429000" cy="1719072"/>
           </a:xfrm>
         </p:spPr>
         <p:txBody>
-          <a:bodyPr vert="horz" lIns="91440" tIns="45720" rIns="91440" bIns="45720" rtlCol="0" anchor="ctr">
+          <a:bodyPr anchor="b">
             <a:normAutofit/>
           </a:bodyPr>
           <a:lstStyle/>
           <a:p>
+            <a:r>
+              <a:rPr lang="en-IL" sz="5400"/>
+              <a:t>more</a:t>
+            </a:r>
+          </a:p>
+        </p:txBody>
+      </p:sp>
+      <p:sp>
+        <p:nvSpPr>
+          <p:cNvPr id="12" name="sketch line">
+            <a:extLst>
+              <a:ext uri="{FF2B5EF4-FFF2-40B4-BE49-F238E27FC236}">
+                <a16:creationId xmlns:a16="http://schemas.microsoft.com/office/drawing/2014/main" id="{CD8B4F24-440B-49E9-B85D-733523DC064B}"/>
+              </a:ext>
+              <a:ext uri="{C183D7F6-B498-43B3-948B-1728B52AA6E4}">
+                <adec:decorative xmlns:adec="http://schemas.microsoft.com/office/drawing/2017/decorative" val="1"/>
+              </a:ext>
+            </a:extLst>
+          </p:cNvPr>
+          <p:cNvSpPr>
+            <a:spLocks noGrp="1" noRot="1" noChangeAspect="1" noMove="1" noResize="1" noEditPoints="1" noAdjustHandles="1" noChangeArrowheads="1" noChangeShapeType="1" noTextEdit="1"/>
+          </p:cNvSpPr>
+          <p:nvPr>
+            <p:extLst>
+              <p:ext uri="{386F3935-93C4-4BCD-93E2-E3B085C9AB24}">
+                <p16:designElem xmlns:p16="http://schemas.microsoft.com/office/powerpoint/2015/main" val="1"/>
+              </p:ext>
+            </p:extLst>
+          </p:nvPr>
+        </p:nvSpPr>
+        <p:spPr>
+          <a:xfrm>
+            <a:off x="643278" y="2573756"/>
+            <a:ext cx="3255095" cy="18288"/>
+          </a:xfrm>
+          <a:custGeom>
+            <a:avLst/>
+            <a:gdLst>
+              <a:gd name="connsiteX0" fmla="*/ 0 w 3255095"/>
+              <a:gd name="connsiteY0" fmla="*/ 0 h 18288"/>
+              <a:gd name="connsiteX1" fmla="*/ 618468 w 3255095"/>
+              <a:gd name="connsiteY1" fmla="*/ 0 h 18288"/>
+              <a:gd name="connsiteX2" fmla="*/ 1269487 w 3255095"/>
+              <a:gd name="connsiteY2" fmla="*/ 0 h 18288"/>
+              <a:gd name="connsiteX3" fmla="*/ 1953057 w 3255095"/>
+              <a:gd name="connsiteY3" fmla="*/ 0 h 18288"/>
+              <a:gd name="connsiteX4" fmla="*/ 2636627 w 3255095"/>
+              <a:gd name="connsiteY4" fmla="*/ 0 h 18288"/>
+              <a:gd name="connsiteX5" fmla="*/ 3255095 w 3255095"/>
+              <a:gd name="connsiteY5" fmla="*/ 0 h 18288"/>
+              <a:gd name="connsiteX6" fmla="*/ 3255095 w 3255095"/>
+              <a:gd name="connsiteY6" fmla="*/ 18288 h 18288"/>
+              <a:gd name="connsiteX7" fmla="*/ 2538974 w 3255095"/>
+              <a:gd name="connsiteY7" fmla="*/ 18288 h 18288"/>
+              <a:gd name="connsiteX8" fmla="*/ 1822853 w 3255095"/>
+              <a:gd name="connsiteY8" fmla="*/ 18288 h 18288"/>
+              <a:gd name="connsiteX9" fmla="*/ 1171834 w 3255095"/>
+              <a:gd name="connsiteY9" fmla="*/ 18288 h 18288"/>
+              <a:gd name="connsiteX10" fmla="*/ 0 w 3255095"/>
+              <a:gd name="connsiteY10" fmla="*/ 18288 h 18288"/>
+              <a:gd name="connsiteX11" fmla="*/ 0 w 3255095"/>
+              <a:gd name="connsiteY11" fmla="*/ 0 h 18288"/>
+            </a:gdLst>
+            <a:ahLst/>
+            <a:cxnLst>
+              <a:cxn ang="0">
+                <a:pos x="connsiteX0" y="connsiteY0"/>
+              </a:cxn>
+              <a:cxn ang="0">
+                <a:pos x="connsiteX1" y="connsiteY1"/>
+              </a:cxn>
+              <a:cxn ang="0">
+                <a:pos x="connsiteX2" y="connsiteY2"/>
+              </a:cxn>
+              <a:cxn ang="0">
+                <a:pos x="connsiteX3" y="connsiteY3"/>
+              </a:cxn>
+              <a:cxn ang="0">
+                <a:pos x="connsiteX4" y="connsiteY4"/>
+              </a:cxn>
+              <a:cxn ang="0">
+                <a:pos x="connsiteX5" y="connsiteY5"/>
+              </a:cxn>
+              <a:cxn ang="0">
+                <a:pos x="connsiteX6" y="connsiteY6"/>
+              </a:cxn>
+              <a:cxn ang="0">
+                <a:pos x="connsiteX7" y="connsiteY7"/>
+              </a:cxn>
+              <a:cxn ang="0">
+                <a:pos x="connsiteX8" y="connsiteY8"/>
+              </a:cxn>
+              <a:cxn ang="0">
+                <a:pos x="connsiteX9" y="connsiteY9"/>
+              </a:cxn>
+              <a:cxn ang="0">
+                <a:pos x="connsiteX10" y="connsiteY10"/>
+              </a:cxn>
+              <a:cxn ang="0">
+                <a:pos x="connsiteX11" y="connsiteY11"/>
+              </a:cxn>
+            </a:cxnLst>
+            <a:rect l="l" t="t" r="r" b="b"/>
+            <a:pathLst>
+              <a:path w="3255095" h="18288" fill="none" extrusionOk="0">
+                <a:moveTo>
+                  <a:pt x="0" y="0"/>
+                </a:moveTo>
+                <a:cubicBezTo>
+                  <a:pt x="240201" y="-22123"/>
+                  <a:pt x="462021" y="-19623"/>
+                  <a:pt x="618468" y="0"/>
+                </a:cubicBezTo>
+                <a:cubicBezTo>
+                  <a:pt x="774915" y="19623"/>
+                  <a:pt x="974734" y="2035"/>
+                  <a:pt x="1269487" y="0"/>
+                </a:cubicBezTo>
+                <a:cubicBezTo>
+                  <a:pt x="1564240" y="-2035"/>
+                  <a:pt x="1733579" y="10639"/>
+                  <a:pt x="1953057" y="0"/>
+                </a:cubicBezTo>
+                <a:cubicBezTo>
+                  <a:pt x="2172535" y="-10639"/>
+                  <a:pt x="2453962" y="14018"/>
+                  <a:pt x="2636627" y="0"/>
+                </a:cubicBezTo>
+                <a:cubicBezTo>
+                  <a:pt x="2819292" y="-14018"/>
+                  <a:pt x="3121375" y="5399"/>
+                  <a:pt x="3255095" y="0"/>
+                </a:cubicBezTo>
+                <a:cubicBezTo>
+                  <a:pt x="3254386" y="8157"/>
+                  <a:pt x="3254682" y="12125"/>
+                  <a:pt x="3255095" y="18288"/>
+                </a:cubicBezTo>
+                <a:cubicBezTo>
+                  <a:pt x="3088545" y="23203"/>
+                  <a:pt x="2687475" y="7419"/>
+                  <a:pt x="2538974" y="18288"/>
+                </a:cubicBezTo>
+                <a:cubicBezTo>
+                  <a:pt x="2390473" y="29157"/>
+                  <a:pt x="2137381" y="-8959"/>
+                  <a:pt x="1822853" y="18288"/>
+                </a:cubicBezTo>
+                <a:cubicBezTo>
+                  <a:pt x="1508325" y="45535"/>
+                  <a:pt x="1466437" y="20385"/>
+                  <a:pt x="1171834" y="18288"/>
+                </a:cubicBezTo>
+                <a:cubicBezTo>
+                  <a:pt x="877231" y="16191"/>
+                  <a:pt x="561097" y="37643"/>
+                  <a:pt x="0" y="18288"/>
+                </a:cubicBezTo>
+                <a:cubicBezTo>
+                  <a:pt x="-46" y="12483"/>
+                  <a:pt x="-203" y="6491"/>
+                  <a:pt x="0" y="0"/>
+                </a:cubicBezTo>
+                <a:close/>
+              </a:path>
+              <a:path w="3255095" h="18288" stroke="0" extrusionOk="0">
+                <a:moveTo>
+                  <a:pt x="0" y="0"/>
+                </a:moveTo>
+                <a:cubicBezTo>
+                  <a:pt x="291965" y="19429"/>
+                  <a:pt x="363155" y="8568"/>
+                  <a:pt x="618468" y="0"/>
+                </a:cubicBezTo>
+                <a:cubicBezTo>
+                  <a:pt x="873781" y="-8568"/>
+                  <a:pt x="904459" y="-19505"/>
+                  <a:pt x="1171834" y="0"/>
+                </a:cubicBezTo>
+                <a:cubicBezTo>
+                  <a:pt x="1439209" y="19505"/>
+                  <a:pt x="1744369" y="9790"/>
+                  <a:pt x="1887955" y="0"/>
+                </a:cubicBezTo>
+                <a:cubicBezTo>
+                  <a:pt x="2031541" y="-9790"/>
+                  <a:pt x="2346378" y="21240"/>
+                  <a:pt x="2506423" y="0"/>
+                </a:cubicBezTo>
+                <a:cubicBezTo>
+                  <a:pt x="2666468" y="-21240"/>
+                  <a:pt x="2990257" y="30414"/>
+                  <a:pt x="3255095" y="0"/>
+                </a:cubicBezTo>
+                <a:cubicBezTo>
+                  <a:pt x="3254831" y="4493"/>
+                  <a:pt x="3255479" y="9472"/>
+                  <a:pt x="3255095" y="18288"/>
+                </a:cubicBezTo>
+                <a:cubicBezTo>
+                  <a:pt x="3120743" y="16690"/>
+                  <a:pt x="2759628" y="42462"/>
+                  <a:pt x="2604076" y="18288"/>
+                </a:cubicBezTo>
+                <a:cubicBezTo>
+                  <a:pt x="2448524" y="-5886"/>
+                  <a:pt x="2184336" y="19599"/>
+                  <a:pt x="1887955" y="18288"/>
+                </a:cubicBezTo>
+                <a:cubicBezTo>
+                  <a:pt x="1591574" y="16977"/>
+                  <a:pt x="1548845" y="6870"/>
+                  <a:pt x="1334589" y="18288"/>
+                </a:cubicBezTo>
+                <a:cubicBezTo>
+                  <a:pt x="1120333" y="29706"/>
+                  <a:pt x="996014" y="9662"/>
+                  <a:pt x="683570" y="18288"/>
+                </a:cubicBezTo>
+                <a:cubicBezTo>
+                  <a:pt x="371126" y="26914"/>
+                  <a:pt x="198687" y="16167"/>
+                  <a:pt x="0" y="18288"/>
+                </a:cubicBezTo>
+                <a:cubicBezTo>
+                  <a:pt x="843" y="9577"/>
+                  <a:pt x="371" y="6900"/>
+                  <a:pt x="0" y="0"/>
+                </a:cubicBezTo>
+                <a:close/>
+              </a:path>
+            </a:pathLst>
+          </a:custGeom>
+          <a:solidFill>
+            <a:schemeClr val="accent2"/>
+          </a:solidFill>
+          <a:ln w="38100" cap="rnd">
+            <a:solidFill>
+              <a:schemeClr val="accent2"/>
+            </a:solidFill>
+            <a:round/>
+            <a:extLst>
+              <a:ext uri="{C807C97D-BFC1-408E-A445-0C87EB9F89A2}">
+                <ask:lineSketchStyleProps xmlns:ask="http://schemas.microsoft.com/office/drawing/2018/sketchyshapes" sd="1219033472">
+                  <a:prstGeom prst="rect">
+                    <a:avLst/>
+                  </a:prstGeom>
+                  <ask:type>
+                    <ask:lineSketchFreehand/>
+                  </ask:type>
+                </ask:lineSketchStyleProps>
+              </a:ext>
+            </a:extLst>
+          </a:ln>
+        </p:spPr>
+        <p:style>
+          <a:lnRef idx="2">
+            <a:schemeClr val="accent1">
+              <a:shade val="50000"/>
+            </a:schemeClr>
+          </a:lnRef>
+          <a:fillRef idx="1">
+            <a:schemeClr val="accent1"/>
+          </a:fillRef>
+          <a:effectRef idx="0">
+            <a:schemeClr val="accent1"/>
+          </a:effectRef>
+          <a:fontRef idx="minor">
+            <a:schemeClr val="lt1"/>
+          </a:fontRef>
+        </p:style>
+        <p:txBody>
+          <a:bodyPr rtlCol="0" anchor="ctr"/>
+          <a:lstStyle/>
+          <a:p>
             <a:pPr algn="ctr"/>
-            <a:r>
-              <a:rPr lang="en-US" sz="3200" kern="1200">
-                <a:solidFill>
-                  <a:schemeClr val="bg1"/>
-                </a:solidFill>
-                <a:latin typeface="+mj-lt"/>
-                <a:ea typeface="+mj-ea"/>
-                <a:cs typeface="+mj-cs"/>
-              </a:rPr>
-              <a:t>Wait what with null and undefiend</a:t>
-            </a:r>
+            <a:endParaRPr lang="en-US"/>
+          </a:p>
+        </p:txBody>
+      </p:sp>
+      <p:sp>
+        <p:nvSpPr>
+          <p:cNvPr id="3" name="Content Placeholder 2">
+            <a:extLst>
+              <a:ext uri="{FF2B5EF4-FFF2-40B4-BE49-F238E27FC236}">
+                <a16:creationId xmlns:a16="http://schemas.microsoft.com/office/drawing/2014/main" id="{85368711-2939-027B-EE1D-0F7E948016DF}"/>
+              </a:ext>
+            </a:extLst>
+          </p:cNvPr>
+          <p:cNvSpPr>
+            <a:spLocks noGrp="1"/>
+          </p:cNvSpPr>
+          <p:nvPr>
+            <p:ph idx="1"/>
+          </p:nvPr>
+        </p:nvSpPr>
+        <p:spPr>
+          <a:xfrm>
+            <a:off x="630936" y="2807208"/>
+            <a:ext cx="3429000" cy="3410712"/>
+          </a:xfrm>
+        </p:spPr>
+        <p:txBody>
+          <a:bodyPr anchor="t">
+            <a:normAutofit/>
+          </a:bodyPr>
+          <a:lstStyle/>
+          <a:p>
+            <a:r>
+              <a:rPr lang="en-US" sz="2200"/>
+              <a:t>To configure Vite to build each page as a separate HTML file, you can add the following code to your vite.config.ts file:</a:t>
+            </a:r>
+            <a:endParaRPr lang="en-IL" sz="2200"/>
           </a:p>
         </p:txBody>
       </p:sp>
       <p:pic>
         <p:nvPicPr>
-          <p:cNvPr id="5" name="Content Placeholder 4" descr="Graphical user interface, text, application&#10;&#10;Description automatically generated">
-            <a:extLst>
-              <a:ext uri="{FF2B5EF4-FFF2-40B4-BE49-F238E27FC236}">
-                <a16:creationId xmlns:a16="http://schemas.microsoft.com/office/drawing/2014/main" id="{3EBB089B-1D67-748C-5A50-23EDBEC5B961}"/>
+          <p:cNvPr id="5" name="Picture 4" descr="A picture containing text, screenshot, font&#10;&#10;Description automatically generated">
+            <a:extLst>
+              <a:ext uri="{FF2B5EF4-FFF2-40B4-BE49-F238E27FC236}">
+                <a16:creationId xmlns:a16="http://schemas.microsoft.com/office/drawing/2014/main" id="{932E6009-39F9-7046-4EA6-14935621AF90}"/>
               </a:ext>
             </a:extLst>
           </p:cNvPr>
           <p:cNvPicPr>
-            <a:picLocks noGrp="1" noChangeAspect="1"/>
+            <a:picLocks noChangeAspect="1"/>
           </p:cNvPicPr>
-          <p:nvPr>
-            <p:ph idx="1"/>
-          </p:nvPr>
+          <p:nvPr/>
         </p:nvPicPr>
         <p:blipFill>
           <a:blip r:embed="rId2"/>
@@ -3855,8 +7584,8 @@
         </p:blipFill>
         <p:spPr>
           <a:xfrm>
-            <a:off x="2155014" y="1675227"/>
-            <a:ext cx="7881971" cy="4394199"/>
+            <a:off x="4654296" y="995439"/>
+            <a:ext cx="6903720" cy="4867121"/>
           </a:xfrm>
           <a:prstGeom prst="rect">
             <a:avLst/>
@@ -3866,87 +7595,7 @@
     </p:spTree>
     <p:extLst>
       <p:ext uri="{BB962C8B-B14F-4D97-AF65-F5344CB8AC3E}">
-        <p14:creationId xmlns:p14="http://schemas.microsoft.com/office/powerpoint/2010/main" val="360308877"/>
-      </p:ext>
-    </p:extLst>
-  </p:cSld>
-  <p:clrMapOvr>
-    <a:masterClrMapping/>
-  </p:clrMapOvr>
-</p:sld>
-</file>
-
-<file path=ppt/slides/slide5.xml><?xml version="1.0" encoding="utf-8"?>
-<p:sld xmlns:a="http://schemas.openxmlformats.org/drawingml/2006/main" xmlns:r="http://schemas.openxmlformats.org/officeDocument/2006/relationships" xmlns:p="http://schemas.openxmlformats.org/presentationml/2006/main">
-  <p:cSld>
-    <p:spTree>
-      <p:nvGrpSpPr>
-        <p:cNvPr id="1" name=""/>
-        <p:cNvGrpSpPr/>
-        <p:nvPr/>
-      </p:nvGrpSpPr>
-      <p:grpSpPr>
-        <a:xfrm>
-          <a:off x="0" y="0"/>
-          <a:ext cx="0" cy="0"/>
-          <a:chOff x="0" y="0"/>
-          <a:chExt cx="0" cy="0"/>
-        </a:xfrm>
-      </p:grpSpPr>
-      <p:sp>
-        <p:nvSpPr>
-          <p:cNvPr id="2" name="Title 1">
-            <a:extLst>
-              <a:ext uri="{FF2B5EF4-FFF2-40B4-BE49-F238E27FC236}">
-                <a16:creationId xmlns:a16="http://schemas.microsoft.com/office/drawing/2014/main" id="{05177CD8-1577-1B43-6A99-F30DDB7D00C4}"/>
-              </a:ext>
-            </a:extLst>
-          </p:cNvPr>
-          <p:cNvSpPr>
-            <a:spLocks noGrp="1"/>
-          </p:cNvSpPr>
-          <p:nvPr>
-            <p:ph type="title"/>
-          </p:nvPr>
-        </p:nvSpPr>
-        <p:spPr/>
-        <p:txBody>
-          <a:bodyPr/>
-          <a:lstStyle/>
-          <a:p>
-            <a:endParaRPr lang="en-IL"/>
-          </a:p>
-        </p:txBody>
-      </p:sp>
-      <p:sp>
-        <p:nvSpPr>
-          <p:cNvPr id="3" name="Content Placeholder 2">
-            <a:extLst>
-              <a:ext uri="{FF2B5EF4-FFF2-40B4-BE49-F238E27FC236}">
-                <a16:creationId xmlns:a16="http://schemas.microsoft.com/office/drawing/2014/main" id="{85368711-2939-027B-EE1D-0F7E948016DF}"/>
-              </a:ext>
-            </a:extLst>
-          </p:cNvPr>
-          <p:cNvSpPr>
-            <a:spLocks noGrp="1"/>
-          </p:cNvSpPr>
-          <p:nvPr>
-            <p:ph idx="1"/>
-          </p:nvPr>
-        </p:nvSpPr>
-        <p:spPr/>
-        <p:txBody>
-          <a:bodyPr/>
-          <a:lstStyle/>
-          <a:p>
-            <a:endParaRPr lang="en-IL"/>
-          </a:p>
-        </p:txBody>
-      </p:sp>
-    </p:spTree>
-    <p:extLst>
-      <p:ext uri="{BB962C8B-B14F-4D97-AF65-F5344CB8AC3E}">
-        <p14:creationId xmlns:p14="http://schemas.microsoft.com/office/powerpoint/2010/main" val="1567562007"/>
+        <p14:creationId xmlns:p14="http://schemas.microsoft.com/office/powerpoint/2010/main" val="2828749949"/>
       </p:ext>
     </p:extLst>
   </p:cSld>
@@ -3994,7 +7643,10 @@
           <a:bodyPr/>
           <a:lstStyle/>
           <a:p>
-            <a:endParaRPr lang="en-IL"/>
+            <a:r>
+              <a:rPr lang="en-IL" dirty="0"/>
+              <a:t>more</a:t>
+            </a:r>
           </a:p>
         </p:txBody>
       </p:sp>
@@ -4016,17 +7668,102 @@
         </p:nvSpPr>
         <p:spPr/>
         <p:txBody>
-          <a:bodyPr/>
-          <a:lstStyle/>
-          <a:p>
-            <a:endParaRPr lang="en-IL"/>
+          <a:bodyPr>
+            <a:normAutofit lnSpcReduction="10000"/>
+          </a:bodyPr>
+          <a:lstStyle/>
+          <a:p>
+            <a:r>
+              <a:rPr lang="en-US" dirty="0"/>
+              <a:t>This code tells </a:t>
+            </a:r>
+            <a:r>
+              <a:rPr lang="en-US" dirty="0" err="1"/>
+              <a:t>Vite</a:t>
+            </a:r>
+            <a:r>
+              <a:rPr lang="en-US" dirty="0"/>
+              <a:t> to use each </a:t>
+            </a:r>
+            <a:r>
+              <a:rPr lang="en-US" dirty="0" err="1"/>
+              <a:t>index.html</a:t>
+            </a:r>
+            <a:r>
+              <a:rPr lang="en-US" dirty="0"/>
+              <a:t> file as the entry point for a separate page.</a:t>
+            </a:r>
+          </a:p>
+          <a:p>
+            <a:r>
+              <a:rPr lang="en-US" dirty="0"/>
+              <a:t>In each HTML file, add the necessary links to your stylesheets and JavaScript files, as well as any other HTML content for that page.</a:t>
+            </a:r>
+          </a:p>
+          <a:p>
+            <a:r>
+              <a:rPr lang="en-US" dirty="0"/>
+              <a:t>To navigate between pages, you can add links or buttons to your HTML files that point to the appropriate pages. For example, to link to your about page, you can add the following to your </a:t>
+            </a:r>
+            <a:r>
+              <a:rPr lang="en-US" dirty="0" err="1"/>
+              <a:t>index.html</a:t>
+            </a:r>
+            <a:r>
+              <a:rPr lang="en-US" dirty="0"/>
+              <a:t> file:</a:t>
+            </a:r>
+          </a:p>
+          <a:p>
+            <a:r>
+              <a:rPr lang="en-US" dirty="0">
+                <a:effectLst/>
+              </a:rPr>
+              <a:t>&lt;a </a:t>
+            </a:r>
+            <a:r>
+              <a:rPr lang="en-US" dirty="0" err="1">
+                <a:solidFill>
+                  <a:srgbClr val="DF3079"/>
+                </a:solidFill>
+                <a:effectLst/>
+              </a:rPr>
+              <a:t>href</a:t>
+            </a:r>
+            <a:r>
+              <a:rPr lang="en-US" dirty="0">
+                <a:effectLst/>
+              </a:rPr>
+              <a:t>=</a:t>
+            </a:r>
+            <a:r>
+              <a:rPr lang="en-US" dirty="0">
+                <a:solidFill>
+                  <a:srgbClr val="00A67D"/>
+                </a:solidFill>
+                <a:effectLst/>
+              </a:rPr>
+              <a:t>"/about/"</a:t>
+            </a:r>
+            <a:r>
+              <a:rPr lang="en-US" dirty="0">
+                <a:effectLst/>
+              </a:rPr>
+              <a:t>&gt;About Us&lt;/a&gt; </a:t>
+            </a:r>
+          </a:p>
+          <a:p>
+            <a:br>
+              <a:rPr lang="en-US" dirty="0"/>
+            </a:br>
+            <a:endParaRPr lang="en-IL" dirty="0"/>
           </a:p>
         </p:txBody>
       </p:sp>
     </p:spTree>
     <p:extLst>
       <p:ext uri="{BB962C8B-B14F-4D97-AF65-F5344CB8AC3E}">
-        <p14:creationId xmlns:p14="http://schemas.microsoft.com/office/powerpoint/2010/main" val="3161341708"/>
+        <p14:creationId xmlns:p14="http://schemas.microsoft.com/office/powerpoint/2010/main" val="2486052648"/>
       </p:ext>
     </p:extLst>
   </p:cSld>
@@ -4106,7 +7843,296 @@
     </p:spTree>
     <p:extLst>
       <p:ext uri="{BB962C8B-B14F-4D97-AF65-F5344CB8AC3E}">
-        <p14:creationId xmlns:p14="http://schemas.microsoft.com/office/powerpoint/2010/main" val="1457496235"/>
+        <p14:creationId xmlns:p14="http://schemas.microsoft.com/office/powerpoint/2010/main" val="1800643244"/>
+      </p:ext>
+    </p:extLst>
+  </p:cSld>
+  <p:clrMapOvr>
+    <a:masterClrMapping/>
+  </p:clrMapOvr>
+</p:sld>
+</file>
+
+<file path=ppt/slides/slide8.xml><?xml version="1.0" encoding="utf-8"?>
+<p:sld xmlns:a="http://schemas.openxmlformats.org/drawingml/2006/main" xmlns:r="http://schemas.openxmlformats.org/officeDocument/2006/relationships" xmlns:p="http://schemas.openxmlformats.org/presentationml/2006/main">
+  <p:cSld>
+    <p:spTree>
+      <p:nvGrpSpPr>
+        <p:cNvPr id="1" name=""/>
+        <p:cNvGrpSpPr/>
+        <p:nvPr/>
+      </p:nvGrpSpPr>
+      <p:grpSpPr>
+        <a:xfrm>
+          <a:off x="0" y="0"/>
+          <a:ext cx="0" cy="0"/>
+          <a:chOff x="0" y="0"/>
+          <a:chExt cx="0" cy="0"/>
+        </a:xfrm>
+      </p:grpSpPr>
+      <p:sp>
+        <p:nvSpPr>
+          <p:cNvPr id="2" name="Title 1">
+            <a:extLst>
+              <a:ext uri="{FF2B5EF4-FFF2-40B4-BE49-F238E27FC236}">
+                <a16:creationId xmlns:a16="http://schemas.microsoft.com/office/drawing/2014/main" id="{4F3B4A9B-D7F0-9D8F-ED16-B1DA143B63BE}"/>
+              </a:ext>
+            </a:extLst>
+          </p:cNvPr>
+          <p:cNvSpPr>
+            <a:spLocks noGrp="1"/>
+          </p:cNvSpPr>
+          <p:nvPr>
+            <p:ph type="title"/>
+          </p:nvPr>
+        </p:nvSpPr>
+        <p:spPr/>
+        <p:txBody>
+          <a:bodyPr/>
+          <a:lstStyle/>
+          <a:p>
+            <a:r>
+              <a:rPr lang="en-US" dirty="0"/>
+              <a:t>Narrowing</a:t>
+            </a:r>
+            <a:endParaRPr lang="en-IL" dirty="0"/>
+          </a:p>
+        </p:txBody>
+      </p:sp>
+      <p:sp>
+        <p:nvSpPr>
+          <p:cNvPr id="3" name="Content Placeholder 2">
+            <a:extLst>
+              <a:ext uri="{FF2B5EF4-FFF2-40B4-BE49-F238E27FC236}">
+                <a16:creationId xmlns:a16="http://schemas.microsoft.com/office/drawing/2014/main" id="{E849330D-8930-A2E4-644F-5197A7592CBB}"/>
+              </a:ext>
+            </a:extLst>
+          </p:cNvPr>
+          <p:cNvSpPr>
+            <a:spLocks noGrp="1"/>
+          </p:cNvSpPr>
+          <p:nvPr>
+            <p:ph idx="1"/>
+          </p:nvPr>
+        </p:nvSpPr>
+        <p:spPr/>
+        <p:txBody>
+          <a:bodyPr/>
+          <a:lstStyle/>
+          <a:p>
+            <a:r>
+              <a:rPr lang="en-US" dirty="0"/>
+              <a:t>In TypeScript, narrowing is the process of refining the type of a variable or expression based on additional information that is available to the compiler at a certain point in the program. This can be done using various constructs such as type guards, type assertions, and control flow analysis.</a:t>
+            </a:r>
+          </a:p>
+          <a:p>
+            <a:r>
+              <a:rPr lang="en-US" dirty="0"/>
+              <a:t>Type guards are functions or expressions that return a </a:t>
+            </a:r>
+            <a:r>
+              <a:rPr lang="en-US" dirty="0" err="1"/>
+              <a:t>boolean</a:t>
+            </a:r>
+            <a:r>
+              <a:rPr lang="en-US" dirty="0"/>
+              <a:t> value, which is used by the TypeScript compiler to narrow the type of a variable. For example, the </a:t>
+            </a:r>
+            <a:r>
+              <a:rPr lang="en-US" dirty="0" err="1"/>
+              <a:t>typeof</a:t>
+            </a:r>
+            <a:r>
+              <a:rPr lang="en-US" dirty="0"/>
+              <a:t> operator can be used as a type guard to narrow the type of a variable based on its type at runtime</a:t>
+            </a:r>
+          </a:p>
+        </p:txBody>
+      </p:sp>
+    </p:spTree>
+    <p:extLst>
+      <p:ext uri="{BB962C8B-B14F-4D97-AF65-F5344CB8AC3E}">
+        <p14:creationId xmlns:p14="http://schemas.microsoft.com/office/powerpoint/2010/main" val="1986193727"/>
+      </p:ext>
+    </p:extLst>
+  </p:cSld>
+  <p:clrMapOvr>
+    <a:masterClrMapping/>
+  </p:clrMapOvr>
+</p:sld>
+</file>
+
+<file path=ppt/slides/slide9.xml><?xml version="1.0" encoding="utf-8"?>
+<p:sld xmlns:a="http://schemas.openxmlformats.org/drawingml/2006/main" xmlns:r="http://schemas.openxmlformats.org/officeDocument/2006/relationships" xmlns:p="http://schemas.openxmlformats.org/presentationml/2006/main">
+  <p:cSld>
+    <p:bg>
+      <p:bgPr>
+        <a:solidFill>
+          <a:schemeClr val="bg1"/>
+        </a:solidFill>
+        <a:effectLst/>
+      </p:bgPr>
+    </p:bg>
+    <p:spTree>
+      <p:nvGrpSpPr>
+        <p:cNvPr id="1" name=""/>
+        <p:cNvGrpSpPr/>
+        <p:nvPr/>
+      </p:nvGrpSpPr>
+      <p:grpSpPr>
+        <a:xfrm>
+          <a:off x="0" y="0"/>
+          <a:ext cx="0" cy="0"/>
+          <a:chOff x="0" y="0"/>
+          <a:chExt cx="0" cy="0"/>
+        </a:xfrm>
+      </p:grpSpPr>
+      <p:sp>
+        <p:nvSpPr>
+          <p:cNvPr id="10" name="Down Arrow 7">
+            <a:extLst>
+              <a:ext uri="{FF2B5EF4-FFF2-40B4-BE49-F238E27FC236}">
+                <a16:creationId xmlns:a16="http://schemas.microsoft.com/office/drawing/2014/main" id="{D4771268-CB57-404A-9271-370EB28F6090}"/>
+              </a:ext>
+              <a:ext uri="{C183D7F6-B498-43B3-948B-1728B52AA6E4}">
+                <adec:decorative xmlns:adec="http://schemas.microsoft.com/office/drawing/2017/decorative" val="1"/>
+              </a:ext>
+            </a:extLst>
+          </p:cNvPr>
+          <p:cNvSpPr>
+            <a:spLocks noGrp="1" noRot="1" noChangeAspect="1" noMove="1" noResize="1" noEditPoints="1" noAdjustHandles="1" noChangeArrowheads="1" noChangeShapeType="1" noTextEdit="1"/>
+          </p:cNvSpPr>
+          <p:nvPr>
+            <p:extLst>
+              <p:ext uri="{386F3935-93C4-4BCD-93E2-E3B085C9AB24}">
+                <p16:designElem xmlns:p16="http://schemas.microsoft.com/office/powerpoint/2015/main" val="1"/>
+              </p:ext>
+            </p:extLst>
+          </p:nvPr>
+        </p:nvSpPr>
+        <p:spPr>
+          <a:xfrm rot="16200000">
+            <a:off x="800100" y="1491343"/>
+            <a:ext cx="3333749" cy="3499103"/>
+          </a:xfrm>
+          <a:prstGeom prst="downArrow">
+            <a:avLst>
+              <a:gd name="adj1" fmla="val 100000"/>
+              <a:gd name="adj2" fmla="val 15788"/>
+            </a:avLst>
+          </a:prstGeom>
+          <a:solidFill>
+            <a:srgbClr val="404040"/>
+          </a:solidFill>
+          <a:ln w="53975">
+            <a:noFill/>
+          </a:ln>
+        </p:spPr>
+        <p:style>
+          <a:lnRef idx="2">
+            <a:schemeClr val="accent1">
+              <a:shade val="50000"/>
+            </a:schemeClr>
+          </a:lnRef>
+          <a:fillRef idx="1">
+            <a:schemeClr val="accent1"/>
+          </a:fillRef>
+          <a:effectRef idx="0">
+            <a:schemeClr val="accent1"/>
+          </a:effectRef>
+          <a:fontRef idx="minor">
+            <a:schemeClr val="lt1"/>
+          </a:fontRef>
+        </p:style>
+        <p:txBody>
+          <a:bodyPr rtlCol="0" anchor="ctr"/>
+          <a:lstStyle/>
+          <a:p>
+            <a:pPr algn="ctr"/>
+            <a:endParaRPr lang="en-US"/>
+          </a:p>
+        </p:txBody>
+      </p:sp>
+      <p:sp>
+        <p:nvSpPr>
+          <p:cNvPr id="2" name="Title 1">
+            <a:extLst>
+              <a:ext uri="{FF2B5EF4-FFF2-40B4-BE49-F238E27FC236}">
+                <a16:creationId xmlns:a16="http://schemas.microsoft.com/office/drawing/2014/main" id="{05177CD8-1577-1B43-6A99-F30DDB7D00C4}"/>
+              </a:ext>
+            </a:extLst>
+          </p:cNvPr>
+          <p:cNvSpPr>
+            <a:spLocks noGrp="1"/>
+          </p:cNvSpPr>
+          <p:nvPr>
+            <p:ph type="title"/>
+          </p:nvPr>
+        </p:nvSpPr>
+        <p:spPr>
+          <a:xfrm>
+            <a:off x="1028700" y="1967266"/>
+            <a:ext cx="2628900" cy="2547257"/>
+          </a:xfrm>
+          <a:noFill/>
+        </p:spPr>
+        <p:txBody>
+          <a:bodyPr vert="horz" lIns="91440" tIns="45720" rIns="91440" bIns="45720" rtlCol="0" anchor="ctr">
+            <a:normAutofit/>
+          </a:bodyPr>
+          <a:lstStyle/>
+          <a:p>
+            <a:pPr algn="ctr"/>
+            <a:r>
+              <a:rPr lang="en-US" sz="3600" kern="1200">
+                <a:solidFill>
+                  <a:srgbClr val="FFFFFF"/>
+                </a:solidFill>
+                <a:latin typeface="+mj-lt"/>
+                <a:ea typeface="+mj-ea"/>
+                <a:cs typeface="+mj-cs"/>
+              </a:rPr>
+              <a:t>Narrowing types options</a:t>
+            </a:r>
+          </a:p>
+        </p:txBody>
+      </p:sp>
+      <p:pic>
+        <p:nvPicPr>
+          <p:cNvPr id="5" name="Content Placeholder 4" descr="A picture containing graphical user interface&#10;&#10;Description automatically generated">
+            <a:extLst>
+              <a:ext uri="{FF2B5EF4-FFF2-40B4-BE49-F238E27FC236}">
+                <a16:creationId xmlns:a16="http://schemas.microsoft.com/office/drawing/2014/main" id="{06D0B032-F8D7-B187-BEB8-F5BE32023EFB}"/>
+              </a:ext>
+            </a:extLst>
+          </p:cNvPr>
+          <p:cNvPicPr>
+            <a:picLocks noGrp="1" noChangeAspect="1"/>
+          </p:cNvPicPr>
+          <p:nvPr>
+            <p:ph idx="1"/>
+          </p:nvPr>
+        </p:nvPicPr>
+        <p:blipFill>
+          <a:blip r:embed="rId2"/>
+          <a:stretch>
+            <a:fillRect/>
+          </a:stretch>
+        </p:blipFill>
+        <p:spPr>
+          <a:xfrm>
+            <a:off x="5564281" y="643466"/>
+            <a:ext cx="5206769" cy="5568739"/>
+          </a:xfrm>
+          <a:prstGeom prst="rect">
+            <a:avLst/>
+          </a:prstGeom>
+        </p:spPr>
+      </p:pic>
+    </p:spTree>
+    <p:extLst>
+      <p:ext uri="{BB962C8B-B14F-4D97-AF65-F5344CB8AC3E}">
+        <p14:creationId xmlns:p14="http://schemas.microsoft.com/office/powerpoint/2010/main" val="2696312600"/>
       </p:ext>
     </p:extLst>
   </p:cSld>

</xml_diff>